<commit_message>
Version before going on holidays
</commit_message>
<xml_diff>
--- a/Presentation/thesis_proposal.pptx
+++ b/Presentation/thesis_proposal.pptx
@@ -5,27 +5,30 @@
     <p:sldMasterId id="2147483651" r:id="rId1"/>
   </p:sldMasterIdLst>
   <p:notesMasterIdLst>
-    <p:notesMasterId r:id="rId17"/>
+    <p:notesMasterId r:id="rId20"/>
   </p:notesMasterIdLst>
   <p:handoutMasterIdLst>
-    <p:handoutMasterId r:id="rId18"/>
+    <p:handoutMasterId r:id="rId21"/>
   </p:handoutMasterIdLst>
   <p:sldIdLst>
     <p:sldId id="256" r:id="rId2"/>
     <p:sldId id="270" r:id="rId3"/>
     <p:sldId id="258" r:id="rId4"/>
-    <p:sldId id="259" r:id="rId5"/>
-    <p:sldId id="260" r:id="rId6"/>
-    <p:sldId id="261" r:id="rId7"/>
-    <p:sldId id="262" r:id="rId8"/>
-    <p:sldId id="263" r:id="rId9"/>
-    <p:sldId id="264" r:id="rId10"/>
-    <p:sldId id="271" r:id="rId11"/>
-    <p:sldId id="265" r:id="rId12"/>
-    <p:sldId id="266" r:id="rId13"/>
-    <p:sldId id="267" r:id="rId14"/>
-    <p:sldId id="268" r:id="rId15"/>
-    <p:sldId id="269" r:id="rId16"/>
+    <p:sldId id="274" r:id="rId5"/>
+    <p:sldId id="272" r:id="rId6"/>
+    <p:sldId id="273" r:id="rId7"/>
+    <p:sldId id="259" r:id="rId8"/>
+    <p:sldId id="260" r:id="rId9"/>
+    <p:sldId id="261" r:id="rId10"/>
+    <p:sldId id="262" r:id="rId11"/>
+    <p:sldId id="263" r:id="rId12"/>
+    <p:sldId id="264" r:id="rId13"/>
+    <p:sldId id="271" r:id="rId14"/>
+    <p:sldId id="265" r:id="rId15"/>
+    <p:sldId id="266" r:id="rId16"/>
+    <p:sldId id="267" r:id="rId17"/>
+    <p:sldId id="268" r:id="rId18"/>
+    <p:sldId id="269" r:id="rId19"/>
   </p:sldIdLst>
   <p:sldSz cx="9144000" cy="5143500" type="screen16x9"/>
   <p:notesSz cx="6858000" cy="9144000"/>
@@ -1060,7 +1063,7 @@
                 <a:cs typeface="Verdana" pitchFamily="34" charset="0"/>
               </a:rPr>
               <a:pPr/>
-              <a:t>8</a:t>
+              <a:t>11</a:t>
             </a:fld>
             <a:endParaRPr lang="nl-NL" sz="1000" dirty="0">
               <a:latin typeface="Verdana" pitchFamily="34" charset="0"/>
@@ -5051,26 +5054,14 @@
           <a:bodyPr/>
           <a:lstStyle/>
           <a:p>
-            <a:r>
-              <a:rPr lang="en-US" dirty="0" smtClean="0"/>
-              <a:t>RL in WNs </a:t>
-            </a:r>
-            <a:r>
-              <a:rPr lang="mr-IN" dirty="0" smtClean="0"/>
-              <a:t>–</a:t>
-            </a:r>
-            <a:r>
-              <a:rPr lang="en-US" dirty="0" smtClean="0"/>
-              <a:t> Feasibility &amp; Considerations</a:t>
-            </a:r>
-            <a:endParaRPr lang="en-US" dirty="0"/>
+            <a:endParaRPr lang="en-US"/>
           </a:p>
         </p:txBody>
       </p:sp>
     </p:spTree>
     <p:extLst>
       <p:ext uri="{BB962C8B-B14F-4D97-AF65-F5344CB8AC3E}">
-        <p14:creationId xmlns:p14="http://schemas.microsoft.com/office/powerpoint/2010/main" val="681448446"/>
+        <p14:creationId xmlns:p14="http://schemas.microsoft.com/office/powerpoint/2010/main" val="640494621"/>
       </p:ext>
     </p:extLst>
   </p:cSld>
@@ -5107,14 +5098,19 @@
             <p:ph type="title"/>
           </p:nvPr>
         </p:nvSpPr>
-        <p:spPr/>
+        <p:spPr>
+          <a:xfrm>
+            <a:off x="3131840" y="1995686"/>
+            <a:ext cx="5472608" cy="1080120"/>
+          </a:xfrm>
+        </p:spPr>
         <p:txBody>
           <a:bodyPr/>
           <a:lstStyle/>
           <a:p>
             <a:r>
               <a:rPr lang="en-US" sz="4400" dirty="0" smtClean="0"/>
-              <a:t>Current Contributions &amp; Ongoing Work</a:t>
+              <a:t>Reinforcement Learning in WNs</a:t>
             </a:r>
             <a:endParaRPr lang="en-US" sz="4400" dirty="0"/>
           </a:p>
@@ -5123,7 +5119,7 @@
     </p:spTree>
     <p:extLst>
       <p:ext uri="{BB962C8B-B14F-4D97-AF65-F5344CB8AC3E}">
-        <p14:creationId xmlns:p14="http://schemas.microsoft.com/office/powerpoint/2010/main" val="897454144"/>
+        <p14:creationId xmlns:p14="http://schemas.microsoft.com/office/powerpoint/2010/main" val="1605056383"/>
       </p:ext>
     </p:extLst>
   </p:cSld>
@@ -5165,7 +5161,15 @@
           <a:bodyPr/>
           <a:lstStyle/>
           <a:p>
-            <a:endParaRPr lang="en-US"/>
+            <a:r>
+              <a:rPr lang="en-US" dirty="0" smtClean="0"/>
+              <a:t>Many categorizations: learner (passive/active), environment (known/unknown), model (with/without states)</a:t>
+            </a:r>
+            <a:r>
+              <a:rPr lang="mr-IN" dirty="0" smtClean="0"/>
+              <a:t>…</a:t>
+            </a:r>
+            <a:endParaRPr lang="en-US" dirty="0"/>
           </a:p>
         </p:txBody>
       </p:sp>
@@ -5208,6 +5212,588 @@
           <a:bodyPr/>
           <a:lstStyle/>
           <a:p>
+            <a:r>
+              <a:rPr lang="en-US" dirty="0" smtClean="0"/>
+              <a:t>RL in WNs </a:t>
+            </a:r>
+            <a:r>
+              <a:rPr lang="mr-IN" dirty="0" smtClean="0"/>
+              <a:t>–</a:t>
+            </a:r>
+            <a:r>
+              <a:rPr lang="en-US" dirty="0" smtClean="0"/>
+              <a:t> State-of-the-Art</a:t>
+            </a:r>
+            <a:endParaRPr lang="en-US" dirty="0"/>
+          </a:p>
+        </p:txBody>
+      </p:sp>
+      <p:sp>
+        <p:nvSpPr>
+          <p:cNvPr id="5" name="TextBox 4"/>
+          <p:cNvSpPr txBox="1"/>
+          <p:nvPr/>
+        </p:nvSpPr>
+        <p:spPr>
+          <a:xfrm>
+            <a:off x="237833" y="2015285"/>
+            <a:ext cx="1329210" cy="1754326"/>
+          </a:xfrm>
+          <a:prstGeom prst="rect">
+            <a:avLst/>
+          </a:prstGeom>
+          <a:noFill/>
+        </p:spPr>
+        <p:txBody>
+          <a:bodyPr wrap="none" rtlCol="0">
+            <a:spAutoFit/>
+          </a:bodyPr>
+          <a:lstStyle/>
+          <a:p>
+            <a:r>
+              <a:rPr lang="en-US" dirty="0" smtClean="0"/>
+              <a:t>Prediction</a:t>
+            </a:r>
+          </a:p>
+          <a:p>
+            <a:endParaRPr lang="en-US" dirty="0"/>
+          </a:p>
+          <a:p>
+            <a:endParaRPr lang="en-US" dirty="0" smtClean="0"/>
+          </a:p>
+          <a:p>
+            <a:endParaRPr lang="en-US" dirty="0" smtClean="0"/>
+          </a:p>
+          <a:p>
+            <a:endParaRPr lang="en-US" dirty="0"/>
+          </a:p>
+          <a:p>
+            <a:r>
+              <a:rPr lang="en-US" dirty="0" smtClean="0"/>
+              <a:t>Control</a:t>
+            </a:r>
+            <a:endParaRPr lang="en-US" dirty="0"/>
+          </a:p>
+        </p:txBody>
+      </p:sp>
+      <p:sp>
+        <p:nvSpPr>
+          <p:cNvPr id="6" name="TextBox 5"/>
+          <p:cNvSpPr txBox="1"/>
+          <p:nvPr/>
+        </p:nvSpPr>
+        <p:spPr>
+          <a:xfrm>
+            <a:off x="4336937" y="3238679"/>
+            <a:ext cx="2493285" cy="1169551"/>
+          </a:xfrm>
+          <a:prstGeom prst="rect">
+            <a:avLst/>
+          </a:prstGeom>
+          <a:noFill/>
+        </p:spPr>
+        <p:txBody>
+          <a:bodyPr wrap="square" rtlCol="0">
+            <a:spAutoFit/>
+          </a:bodyPr>
+          <a:lstStyle/>
+          <a:p>
+            <a:r>
+              <a:rPr lang="en-US" sz="1400" dirty="0" smtClean="0"/>
+              <a:t>* Direct methods (estimate </a:t>
+            </a:r>
+          </a:p>
+          <a:p>
+            <a:r>
+              <a:rPr lang="en-US" sz="1400" dirty="0" smtClean="0"/>
+              <a:t>the optimal action-values directly)</a:t>
+            </a:r>
+          </a:p>
+          <a:p>
+            <a:r>
+              <a:rPr lang="en-US" sz="1400" dirty="0" smtClean="0"/>
+              <a:t>* Actor- </a:t>
+            </a:r>
+            <a:r>
+              <a:rPr lang="en-US" sz="1400" dirty="0"/>
+              <a:t>critic </a:t>
+            </a:r>
+            <a:r>
+              <a:rPr lang="en-US" sz="1400" dirty="0" smtClean="0"/>
+              <a:t>methods</a:t>
+            </a:r>
+            <a:endParaRPr lang="en-US" dirty="0"/>
+          </a:p>
+        </p:txBody>
+      </p:sp>
+      <p:sp>
+        <p:nvSpPr>
+          <p:cNvPr id="7" name="Rectangle 6"/>
+          <p:cNvSpPr/>
+          <p:nvPr/>
+        </p:nvSpPr>
+        <p:spPr>
+          <a:xfrm>
+            <a:off x="6975352" y="3392566"/>
+            <a:ext cx="1991663" cy="830997"/>
+          </a:xfrm>
+          <a:prstGeom prst="rect">
+            <a:avLst/>
+          </a:prstGeom>
+        </p:spPr>
+        <p:txBody>
+          <a:bodyPr wrap="square">
+            <a:spAutoFit/>
+          </a:bodyPr>
+          <a:lstStyle/>
+          <a:p>
+            <a:r>
+              <a:rPr lang="en-US" sz="1600" dirty="0">
+                <a:latin typeface="CMR12" charset="0"/>
+              </a:rPr>
+              <a:t>based on direct policy improvement and policy gradient </a:t>
+            </a:r>
+            <a:endParaRPr lang="en-US" sz="1600" dirty="0"/>
+          </a:p>
+        </p:txBody>
+      </p:sp>
+      <p:sp>
+        <p:nvSpPr>
+          <p:cNvPr id="8" name="Rectangle 7"/>
+          <p:cNvSpPr/>
+          <p:nvPr/>
+        </p:nvSpPr>
+        <p:spPr>
+          <a:xfrm>
+            <a:off x="1614449" y="2854616"/>
+            <a:ext cx="7377127" cy="369332"/>
+          </a:xfrm>
+          <a:prstGeom prst="rect">
+            <a:avLst/>
+          </a:prstGeom>
+        </p:spPr>
+        <p:txBody>
+          <a:bodyPr wrap="square">
+            <a:spAutoFit/>
+          </a:bodyPr>
+          <a:lstStyle/>
+          <a:p>
+            <a:r>
+              <a:rPr lang="en-US" dirty="0" smtClean="0">
+                <a:latin typeface="CMR12" charset="0"/>
+              </a:rPr>
+              <a:t>+ optimizing </a:t>
+            </a:r>
+            <a:r>
+              <a:rPr lang="en-US" dirty="0">
+                <a:latin typeface="CMR12" charset="0"/>
+              </a:rPr>
+              <a:t>online </a:t>
+            </a:r>
+            <a:r>
+              <a:rPr lang="en-US" dirty="0" smtClean="0">
+                <a:latin typeface="CMR12" charset="0"/>
+              </a:rPr>
+              <a:t>performance </a:t>
+            </a:r>
+            <a:r>
+              <a:rPr lang="en-US" sz="1600" dirty="0" smtClean="0">
+                <a:latin typeface="CMR12" charset="0"/>
+              </a:rPr>
+              <a:t>(</a:t>
+            </a:r>
+            <a:r>
+              <a:rPr lang="en-US" sz="1600" dirty="0"/>
+              <a:t>bandit problems and </a:t>
+            </a:r>
+            <a:r>
+              <a:rPr lang="en-US" sz="1600" dirty="0" smtClean="0"/>
+              <a:t>MDPs</a:t>
+            </a:r>
+            <a:r>
+              <a:rPr lang="en-US" sz="1600" dirty="0" smtClean="0">
+                <a:latin typeface="CMR12" charset="0"/>
+              </a:rPr>
+              <a:t>) </a:t>
+            </a:r>
+            <a:endParaRPr lang="en-US" sz="1600" dirty="0"/>
+          </a:p>
+        </p:txBody>
+      </p:sp>
+      <p:sp>
+        <p:nvSpPr>
+          <p:cNvPr id="9" name="Rectangle 8"/>
+          <p:cNvSpPr/>
+          <p:nvPr/>
+        </p:nvSpPr>
+        <p:spPr>
+          <a:xfrm>
+            <a:off x="1631775" y="3207901"/>
+            <a:ext cx="2679188" cy="1200329"/>
+          </a:xfrm>
+          <a:prstGeom prst="rect">
+            <a:avLst/>
+          </a:prstGeom>
+        </p:spPr>
+        <p:txBody>
+          <a:bodyPr wrap="square">
+            <a:spAutoFit/>
+          </a:bodyPr>
+          <a:lstStyle/>
+          <a:p>
+            <a:r>
+              <a:rPr lang="en-US" dirty="0" smtClean="0">
+                <a:latin typeface="CMR12" charset="0"/>
+              </a:rPr>
+              <a:t>+ methods </a:t>
+            </a:r>
+            <a:r>
+              <a:rPr lang="en-US" dirty="0">
+                <a:latin typeface="CMR12" charset="0"/>
+              </a:rPr>
+              <a:t>that aim at developing methods that can be used in large-scale applications </a:t>
+            </a:r>
+            <a:endParaRPr lang="en-US" dirty="0"/>
+          </a:p>
+        </p:txBody>
+      </p:sp>
+      <p:sp>
+        <p:nvSpPr>
+          <p:cNvPr id="10" name="Left Brace 9"/>
+          <p:cNvSpPr/>
+          <p:nvPr/>
+        </p:nvSpPr>
+        <p:spPr>
+          <a:xfrm>
+            <a:off x="1317571" y="2897965"/>
+            <a:ext cx="254101" cy="1618001"/>
+          </a:xfrm>
+          <a:prstGeom prst="leftBrace">
+            <a:avLst/>
+          </a:prstGeom>
+        </p:spPr>
+        <p:style>
+          <a:lnRef idx="1">
+            <a:schemeClr val="accent1"/>
+          </a:lnRef>
+          <a:fillRef idx="0">
+            <a:schemeClr val="accent1"/>
+          </a:fillRef>
+          <a:effectRef idx="0">
+            <a:schemeClr val="accent1"/>
+          </a:effectRef>
+          <a:fontRef idx="minor">
+            <a:schemeClr val="tx1"/>
+          </a:fontRef>
+        </p:style>
+        <p:txBody>
+          <a:bodyPr rtlCol="0" anchor="ctr"/>
+          <a:lstStyle/>
+          <a:p>
+            <a:pPr algn="ctr"/>
+            <a:endParaRPr lang="en-US"/>
+          </a:p>
+        </p:txBody>
+      </p:sp>
+      <p:sp>
+        <p:nvSpPr>
+          <p:cNvPr id="11" name="Left Brace 10"/>
+          <p:cNvSpPr/>
+          <p:nvPr/>
+        </p:nvSpPr>
+        <p:spPr>
+          <a:xfrm>
+            <a:off x="4097835" y="3266418"/>
+            <a:ext cx="273231" cy="1156544"/>
+          </a:xfrm>
+          <a:prstGeom prst="leftBrace">
+            <a:avLst/>
+          </a:prstGeom>
+        </p:spPr>
+        <p:style>
+          <a:lnRef idx="1">
+            <a:schemeClr val="accent1"/>
+          </a:lnRef>
+          <a:fillRef idx="0">
+            <a:schemeClr val="accent1"/>
+          </a:fillRef>
+          <a:effectRef idx="0">
+            <a:schemeClr val="accent1"/>
+          </a:effectRef>
+          <a:fontRef idx="minor">
+            <a:schemeClr val="tx1"/>
+          </a:fontRef>
+        </p:style>
+        <p:txBody>
+          <a:bodyPr rtlCol="0" anchor="ctr"/>
+          <a:lstStyle/>
+          <a:p>
+            <a:pPr algn="ctr"/>
+            <a:endParaRPr lang="en-US"/>
+          </a:p>
+        </p:txBody>
+      </p:sp>
+      <p:sp>
+        <p:nvSpPr>
+          <p:cNvPr id="13" name="Left Brace 12"/>
+          <p:cNvSpPr/>
+          <p:nvPr/>
+        </p:nvSpPr>
+        <p:spPr>
+          <a:xfrm flipH="1">
+            <a:off x="6795239" y="3215406"/>
+            <a:ext cx="153025" cy="1228552"/>
+          </a:xfrm>
+          <a:prstGeom prst="leftBrace">
+            <a:avLst/>
+          </a:prstGeom>
+        </p:spPr>
+        <p:style>
+          <a:lnRef idx="1">
+            <a:schemeClr val="accent1"/>
+          </a:lnRef>
+          <a:fillRef idx="0">
+            <a:schemeClr val="accent1"/>
+          </a:fillRef>
+          <a:effectRef idx="0">
+            <a:schemeClr val="accent1"/>
+          </a:effectRef>
+          <a:fontRef idx="minor">
+            <a:schemeClr val="tx1"/>
+          </a:fontRef>
+        </p:style>
+        <p:txBody>
+          <a:bodyPr rtlCol="0" anchor="ctr"/>
+          <a:lstStyle/>
+          <a:p>
+            <a:pPr algn="ctr"/>
+            <a:endParaRPr lang="en-US"/>
+          </a:p>
+        </p:txBody>
+      </p:sp>
+      <p:sp>
+        <p:nvSpPr>
+          <p:cNvPr id="15" name="Rectangle 14"/>
+          <p:cNvSpPr/>
+          <p:nvPr/>
+        </p:nvSpPr>
+        <p:spPr>
+          <a:xfrm>
+            <a:off x="1567044" y="1830619"/>
+            <a:ext cx="2631326" cy="1200329"/>
+          </a:xfrm>
+          <a:prstGeom prst="rect">
+            <a:avLst/>
+          </a:prstGeom>
+        </p:spPr>
+        <p:txBody>
+          <a:bodyPr wrap="square">
+            <a:spAutoFit/>
+          </a:bodyPr>
+          <a:lstStyle/>
+          <a:p>
+            <a:r>
+              <a:rPr lang="en-US" dirty="0" smtClean="0">
+                <a:latin typeface="CMR12" charset="0"/>
+              </a:rPr>
+              <a:t>+ tabular (Monte-Carlo and TD(</a:t>
+            </a:r>
+            <a:r>
+              <a:rPr lang="en-US" dirty="0" err="1">
+                <a:latin typeface="CMR12" charset="0"/>
+              </a:rPr>
+              <a:t>λ</a:t>
+            </a:r>
+            <a:r>
+              <a:rPr lang="en-US" dirty="0" smtClean="0">
+                <a:latin typeface="CMR12" charset="0"/>
+              </a:rPr>
+              <a:t>))</a:t>
+            </a:r>
+            <a:endParaRPr lang="en-US" dirty="0">
+              <a:latin typeface="CMR12" charset="0"/>
+            </a:endParaRPr>
+          </a:p>
+          <a:p>
+            <a:r>
+              <a:rPr lang="en-US" dirty="0" smtClean="0">
+                <a:latin typeface="CMR12" charset="0"/>
+              </a:rPr>
+              <a:t>+ Function approximation (large </a:t>
+            </a:r>
+            <a:r>
+              <a:rPr lang="en-US" dirty="0">
+                <a:latin typeface="CMR12" charset="0"/>
+              </a:rPr>
+              <a:t>states </a:t>
+            </a:r>
+            <a:r>
+              <a:rPr lang="en-US" dirty="0" smtClean="0">
+                <a:latin typeface="CMR12" charset="0"/>
+              </a:rPr>
+              <a:t>space) </a:t>
+            </a:r>
+            <a:endParaRPr lang="en-US" dirty="0">
+              <a:latin typeface="CMR12" charset="0"/>
+            </a:endParaRPr>
+          </a:p>
+        </p:txBody>
+      </p:sp>
+      <p:sp>
+        <p:nvSpPr>
+          <p:cNvPr id="16" name="Rectangle 15"/>
+          <p:cNvSpPr/>
+          <p:nvPr/>
+        </p:nvSpPr>
+        <p:spPr>
+          <a:xfrm>
+            <a:off x="4225457" y="2135357"/>
+            <a:ext cx="4679486" cy="923330"/>
+          </a:xfrm>
+          <a:prstGeom prst="rect">
+            <a:avLst/>
+          </a:prstGeom>
+        </p:spPr>
+        <p:txBody>
+          <a:bodyPr wrap="none">
+            <a:spAutoFit/>
+          </a:bodyPr>
+          <a:lstStyle/>
+          <a:p>
+            <a:r>
+              <a:rPr lang="en-US" dirty="0" smtClean="0">
+                <a:latin typeface="CMR12" charset="0"/>
+              </a:rPr>
+              <a:t>* gradient </a:t>
+            </a:r>
+            <a:r>
+              <a:rPr lang="en-US" dirty="0">
+                <a:latin typeface="CMR12" charset="0"/>
+              </a:rPr>
+              <a:t>descend </a:t>
+            </a:r>
+            <a:r>
+              <a:rPr lang="en-US" dirty="0" smtClean="0">
+                <a:latin typeface="CMR12" charset="0"/>
+              </a:rPr>
+              <a:t>(GTD2 and TDC)</a:t>
+            </a:r>
+          </a:p>
+          <a:p>
+            <a:r>
+              <a:rPr lang="en-US" dirty="0" smtClean="0">
+                <a:latin typeface="CMR12" charset="0"/>
+              </a:rPr>
+              <a:t>* least-squares methods </a:t>
+            </a:r>
+            <a:r>
+              <a:rPr lang="en-US" dirty="0">
+                <a:latin typeface="CMR12" charset="0"/>
+              </a:rPr>
+              <a:t>(LSTD(</a:t>
+            </a:r>
+            <a:r>
+              <a:rPr lang="en-US" dirty="0" err="1">
+                <a:latin typeface="CMR12" charset="0"/>
+              </a:rPr>
+              <a:t>λ</a:t>
+            </a:r>
+            <a:r>
+              <a:rPr lang="en-US" dirty="0">
+                <a:latin typeface="CMR12" charset="0"/>
+              </a:rPr>
+              <a:t>) and </a:t>
+            </a:r>
+            <a:r>
+              <a:rPr lang="en-US" dirty="0" err="1">
+                <a:latin typeface="CMR12" charset="0"/>
+              </a:rPr>
+              <a:t>λ</a:t>
+            </a:r>
+            <a:r>
+              <a:rPr lang="en-US" dirty="0">
+                <a:latin typeface="CMR12" charset="0"/>
+              </a:rPr>
+              <a:t>-LSPE) </a:t>
+            </a:r>
+          </a:p>
+          <a:p>
+            <a:endParaRPr lang="en-US" dirty="0"/>
+          </a:p>
+        </p:txBody>
+      </p:sp>
+      <p:sp>
+        <p:nvSpPr>
+          <p:cNvPr id="17" name="Left Brace 16"/>
+          <p:cNvSpPr/>
+          <p:nvPr/>
+        </p:nvSpPr>
+        <p:spPr>
+          <a:xfrm>
+            <a:off x="4139952" y="2127045"/>
+            <a:ext cx="171011" cy="588721"/>
+          </a:xfrm>
+          <a:prstGeom prst="leftBrace">
+            <a:avLst/>
+          </a:prstGeom>
+        </p:spPr>
+        <p:style>
+          <a:lnRef idx="1">
+            <a:schemeClr val="accent1"/>
+          </a:lnRef>
+          <a:fillRef idx="0">
+            <a:schemeClr val="accent1"/>
+          </a:fillRef>
+          <a:effectRef idx="0">
+            <a:schemeClr val="accent1"/>
+          </a:effectRef>
+          <a:fontRef idx="minor">
+            <a:schemeClr val="tx1"/>
+          </a:fontRef>
+        </p:style>
+        <p:txBody>
+          <a:bodyPr rtlCol="0" anchor="ctr"/>
+          <a:lstStyle/>
+          <a:p>
+            <a:pPr algn="ctr"/>
+            <a:endParaRPr lang="en-US"/>
+          </a:p>
+        </p:txBody>
+      </p:sp>
+      <p:sp>
+        <p:nvSpPr>
+          <p:cNvPr id="18" name="Left Brace 17"/>
+          <p:cNvSpPr/>
+          <p:nvPr/>
+        </p:nvSpPr>
+        <p:spPr>
+          <a:xfrm>
+            <a:off x="1475656" y="1934318"/>
+            <a:ext cx="252458" cy="776282"/>
+          </a:xfrm>
+          <a:prstGeom prst="leftBrace">
+            <a:avLst/>
+          </a:prstGeom>
+        </p:spPr>
+        <p:style>
+          <a:lnRef idx="1">
+            <a:schemeClr val="accent1"/>
+          </a:lnRef>
+          <a:fillRef idx="0">
+            <a:schemeClr val="accent1"/>
+          </a:fillRef>
+          <a:effectRef idx="0">
+            <a:schemeClr val="accent1"/>
+          </a:effectRef>
+          <a:fontRef idx="minor">
+            <a:schemeClr val="tx1"/>
+          </a:fontRef>
+        </p:style>
+        <p:txBody>
+          <a:bodyPr rtlCol="0" anchor="ctr"/>
+          <a:lstStyle/>
+          <a:p>
+            <a:pPr algn="ctr"/>
             <a:endParaRPr lang="en-US"/>
           </a:p>
         </p:txBody>
@@ -5215,7 +5801,7 @@
     </p:spTree>
     <p:extLst>
       <p:ext uri="{BB962C8B-B14F-4D97-AF65-F5344CB8AC3E}">
-        <p14:creationId xmlns:p14="http://schemas.microsoft.com/office/powerpoint/2010/main" val="1734145327"/>
+        <p14:creationId xmlns:p14="http://schemas.microsoft.com/office/powerpoint/2010/main" val="998345165"/>
       </p:ext>
     </p:extLst>
   </p:cSld>
@@ -5244,7 +5830,50 @@
       </p:grpSpPr>
       <p:sp>
         <p:nvSpPr>
-          <p:cNvPr id="2" name="Title 1"/>
+          <p:cNvPr id="2" name="Content Placeholder 1"/>
+          <p:cNvSpPr>
+            <a:spLocks noGrp="1"/>
+          </p:cNvSpPr>
+          <p:nvPr>
+            <p:ph idx="1"/>
+          </p:nvPr>
+        </p:nvSpPr>
+        <p:spPr/>
+        <p:txBody>
+          <a:bodyPr/>
+          <a:lstStyle/>
+          <a:p>
+            <a:endParaRPr lang="en-US"/>
+          </a:p>
+        </p:txBody>
+      </p:sp>
+      <p:sp>
+        <p:nvSpPr>
+          <p:cNvPr id="3" name="Slide Number Placeholder 2"/>
+          <p:cNvSpPr>
+            <a:spLocks noGrp="1"/>
+          </p:cNvSpPr>
+          <p:nvPr>
+            <p:ph type="sldNum" sz="quarter" idx="4"/>
+          </p:nvPr>
+        </p:nvSpPr>
+        <p:spPr/>
+        <p:txBody>
+          <a:bodyPr/>
+          <a:lstStyle/>
+          <a:p>
+            <a:fld id="{DAF489CC-3B7A-4DA5-A8C0-4984788D0EC5}" type="slidenum">
+              <a:rPr lang="nl-NL" smtClean="0"/>
+              <a:pPr/>
+              <a:t>13</a:t>
+            </a:fld>
+            <a:endParaRPr lang="nl-NL" dirty="0"/>
+          </a:p>
+        </p:txBody>
+      </p:sp>
+      <p:sp>
+        <p:nvSpPr>
+          <p:cNvPr id="4" name="Title 3"/>
           <p:cNvSpPr>
             <a:spLocks noGrp="1"/>
           </p:cNvSpPr>
@@ -5258,17 +5887,25 @@
           <a:lstStyle/>
           <a:p>
             <a:r>
-              <a:rPr lang="en-US" sz="4400" dirty="0" smtClean="0"/>
-              <a:t>Future Work</a:t>
-            </a:r>
-            <a:endParaRPr lang="en-US" sz="4400" dirty="0"/>
+              <a:rPr lang="en-US" dirty="0" smtClean="0"/>
+              <a:t>RL in WNs </a:t>
+            </a:r>
+            <a:r>
+              <a:rPr lang="mr-IN" dirty="0" smtClean="0"/>
+              <a:t>–</a:t>
+            </a:r>
+            <a:r>
+              <a:rPr lang="en-US" dirty="0" smtClean="0"/>
+              <a:t> Feasibility &amp; Considerations</a:t>
+            </a:r>
+            <a:endParaRPr lang="en-US" dirty="0"/>
           </a:p>
         </p:txBody>
       </p:sp>
     </p:spTree>
     <p:extLst>
       <p:ext uri="{BB962C8B-B14F-4D97-AF65-F5344CB8AC3E}">
-        <p14:creationId xmlns:p14="http://schemas.microsoft.com/office/powerpoint/2010/main" val="132453805"/>
+        <p14:creationId xmlns:p14="http://schemas.microsoft.com/office/powerpoint/2010/main" val="681448446"/>
       </p:ext>
     </p:extLst>
   </p:cSld>
@@ -5297,6 +5934,59 @@
       </p:grpSpPr>
       <p:sp>
         <p:nvSpPr>
+          <p:cNvPr id="2" name="Title 1"/>
+          <p:cNvSpPr>
+            <a:spLocks noGrp="1"/>
+          </p:cNvSpPr>
+          <p:nvPr>
+            <p:ph type="title"/>
+          </p:nvPr>
+        </p:nvSpPr>
+        <p:spPr/>
+        <p:txBody>
+          <a:bodyPr/>
+          <a:lstStyle/>
+          <a:p>
+            <a:r>
+              <a:rPr lang="en-US" sz="4400" dirty="0" smtClean="0"/>
+              <a:t>Current Contributions &amp; Ongoing Work</a:t>
+            </a:r>
+            <a:endParaRPr lang="en-US" sz="4400" dirty="0"/>
+          </a:p>
+        </p:txBody>
+      </p:sp>
+    </p:spTree>
+    <p:extLst>
+      <p:ext uri="{BB962C8B-B14F-4D97-AF65-F5344CB8AC3E}">
+        <p14:creationId xmlns:p14="http://schemas.microsoft.com/office/powerpoint/2010/main" val="897454144"/>
+      </p:ext>
+    </p:extLst>
+  </p:cSld>
+  <p:clrMapOvr>
+    <a:masterClrMapping/>
+  </p:clrMapOvr>
+</p:sld>
+</file>
+
+<file path=ppt/slides/slide15.xml><?xml version="1.0" encoding="utf-8"?>
+<p:sld xmlns:a="http://schemas.openxmlformats.org/drawingml/2006/main" xmlns:r="http://schemas.openxmlformats.org/officeDocument/2006/relationships" xmlns:p="http://schemas.openxmlformats.org/presentationml/2006/main">
+  <p:cSld>
+    <p:spTree>
+      <p:nvGrpSpPr>
+        <p:cNvPr id="1" name=""/>
+        <p:cNvGrpSpPr/>
+        <p:nvPr/>
+      </p:nvGrpSpPr>
+      <p:grpSpPr>
+        <a:xfrm>
+          <a:off x="0" y="0"/>
+          <a:ext cx="0" cy="0"/>
+          <a:chOff x="0" y="0"/>
+          <a:chExt cx="0" cy="0"/>
+        </a:xfrm>
+      </p:grpSpPr>
+      <p:sp>
+        <p:nvSpPr>
           <p:cNvPr id="2" name="Content Placeholder 1"/>
           <p:cNvSpPr>
             <a:spLocks noGrp="1"/>
@@ -5332,7 +6022,152 @@
             <a:fld id="{DAF489CC-3B7A-4DA5-A8C0-4984788D0EC5}" type="slidenum">
               <a:rPr lang="nl-NL" smtClean="0"/>
               <a:pPr/>
-              <a:t>14</a:t>
+              <a:t>15</a:t>
+            </a:fld>
+            <a:endParaRPr lang="nl-NL" dirty="0"/>
+          </a:p>
+        </p:txBody>
+      </p:sp>
+      <p:sp>
+        <p:nvSpPr>
+          <p:cNvPr id="4" name="Title 3"/>
+          <p:cNvSpPr>
+            <a:spLocks noGrp="1"/>
+          </p:cNvSpPr>
+          <p:nvPr>
+            <p:ph type="title"/>
+          </p:nvPr>
+        </p:nvSpPr>
+        <p:spPr/>
+        <p:txBody>
+          <a:bodyPr/>
+          <a:lstStyle/>
+          <a:p>
+            <a:endParaRPr lang="en-US"/>
+          </a:p>
+        </p:txBody>
+      </p:sp>
+    </p:spTree>
+    <p:extLst>
+      <p:ext uri="{BB962C8B-B14F-4D97-AF65-F5344CB8AC3E}">
+        <p14:creationId xmlns:p14="http://schemas.microsoft.com/office/powerpoint/2010/main" val="1734145327"/>
+      </p:ext>
+    </p:extLst>
+  </p:cSld>
+  <p:clrMapOvr>
+    <a:masterClrMapping/>
+  </p:clrMapOvr>
+</p:sld>
+</file>
+
+<file path=ppt/slides/slide16.xml><?xml version="1.0" encoding="utf-8"?>
+<p:sld xmlns:a="http://schemas.openxmlformats.org/drawingml/2006/main" xmlns:r="http://schemas.openxmlformats.org/officeDocument/2006/relationships" xmlns:p="http://schemas.openxmlformats.org/presentationml/2006/main">
+  <p:cSld>
+    <p:spTree>
+      <p:nvGrpSpPr>
+        <p:cNvPr id="1" name=""/>
+        <p:cNvGrpSpPr/>
+        <p:nvPr/>
+      </p:nvGrpSpPr>
+      <p:grpSpPr>
+        <a:xfrm>
+          <a:off x="0" y="0"/>
+          <a:ext cx="0" cy="0"/>
+          <a:chOff x="0" y="0"/>
+          <a:chExt cx="0" cy="0"/>
+        </a:xfrm>
+      </p:grpSpPr>
+      <p:sp>
+        <p:nvSpPr>
+          <p:cNvPr id="2" name="Title 1"/>
+          <p:cNvSpPr>
+            <a:spLocks noGrp="1"/>
+          </p:cNvSpPr>
+          <p:nvPr>
+            <p:ph type="title"/>
+          </p:nvPr>
+        </p:nvSpPr>
+        <p:spPr/>
+        <p:txBody>
+          <a:bodyPr/>
+          <a:lstStyle/>
+          <a:p>
+            <a:r>
+              <a:rPr lang="en-US" sz="4400" dirty="0" smtClean="0"/>
+              <a:t>Future Work</a:t>
+            </a:r>
+            <a:endParaRPr lang="en-US" sz="4400" dirty="0"/>
+          </a:p>
+        </p:txBody>
+      </p:sp>
+    </p:spTree>
+    <p:extLst>
+      <p:ext uri="{BB962C8B-B14F-4D97-AF65-F5344CB8AC3E}">
+        <p14:creationId xmlns:p14="http://schemas.microsoft.com/office/powerpoint/2010/main" val="132453805"/>
+      </p:ext>
+    </p:extLst>
+  </p:cSld>
+  <p:clrMapOvr>
+    <a:masterClrMapping/>
+  </p:clrMapOvr>
+</p:sld>
+</file>
+
+<file path=ppt/slides/slide17.xml><?xml version="1.0" encoding="utf-8"?>
+<p:sld xmlns:a="http://schemas.openxmlformats.org/drawingml/2006/main" xmlns:r="http://schemas.openxmlformats.org/officeDocument/2006/relationships" xmlns:p="http://schemas.openxmlformats.org/presentationml/2006/main">
+  <p:cSld>
+    <p:spTree>
+      <p:nvGrpSpPr>
+        <p:cNvPr id="1" name=""/>
+        <p:cNvGrpSpPr/>
+        <p:nvPr/>
+      </p:nvGrpSpPr>
+      <p:grpSpPr>
+        <a:xfrm>
+          <a:off x="0" y="0"/>
+          <a:ext cx="0" cy="0"/>
+          <a:chOff x="0" y="0"/>
+          <a:chExt cx="0" cy="0"/>
+        </a:xfrm>
+      </p:grpSpPr>
+      <p:sp>
+        <p:nvSpPr>
+          <p:cNvPr id="2" name="Content Placeholder 1"/>
+          <p:cNvSpPr>
+            <a:spLocks noGrp="1"/>
+          </p:cNvSpPr>
+          <p:nvPr>
+            <p:ph idx="1"/>
+          </p:nvPr>
+        </p:nvSpPr>
+        <p:spPr/>
+        <p:txBody>
+          <a:bodyPr/>
+          <a:lstStyle/>
+          <a:p>
+            <a:endParaRPr lang="en-US"/>
+          </a:p>
+        </p:txBody>
+      </p:sp>
+      <p:sp>
+        <p:nvSpPr>
+          <p:cNvPr id="3" name="Slide Number Placeholder 2"/>
+          <p:cNvSpPr>
+            <a:spLocks noGrp="1"/>
+          </p:cNvSpPr>
+          <p:nvPr>
+            <p:ph type="sldNum" sz="quarter" idx="4"/>
+          </p:nvPr>
+        </p:nvSpPr>
+        <p:spPr/>
+        <p:txBody>
+          <a:bodyPr/>
+          <a:lstStyle/>
+          <a:p>
+            <a:fld id="{DAF489CC-3B7A-4DA5-A8C0-4984788D0EC5}" type="slidenum">
+              <a:rPr lang="nl-NL" smtClean="0"/>
+              <a:pPr/>
+              <a:t>17</a:t>
             </a:fld>
             <a:endParaRPr lang="nl-NL" dirty="0"/>
           </a:p>
@@ -5370,7 +6205,7 @@
 </p:sld>
 </file>
 
-<file path=ppt/slides/slide15.xml><?xml version="1.0" encoding="utf-8"?>
+<file path=ppt/slides/slide18.xml><?xml version="1.0" encoding="utf-8"?>
 <p:sld xmlns:a="http://schemas.openxmlformats.org/drawingml/2006/main" xmlns:r="http://schemas.openxmlformats.org/officeDocument/2006/relationships" xmlns:p="http://schemas.openxmlformats.org/presentationml/2006/main">
   <p:cSld>
     <p:spTree>
@@ -5520,7 +6355,29 @@
           <a:bodyPr/>
           <a:lstStyle/>
           <a:p>
-            <a:endParaRPr lang="en-US"/>
+            <a:r>
+              <a:rPr lang="en-US" dirty="0" smtClean="0"/>
+              <a:t>Explain main goal: move WNs to RL/AI</a:t>
+            </a:r>
+          </a:p>
+          <a:p>
+            <a:r>
+              <a:rPr lang="en-US" dirty="0" smtClean="0"/>
+              <a:t>Explain the issues in dense WN</a:t>
+            </a:r>
+          </a:p>
+          <a:p>
+            <a:r>
+              <a:rPr lang="en-US" dirty="0" smtClean="0"/>
+              <a:t>Explain possibilities (time, frequency, space)</a:t>
+            </a:r>
+          </a:p>
+          <a:p>
+            <a:r>
+              <a:rPr lang="en-US" dirty="0" smtClean="0"/>
+              <a:t>Characterize scenarios (IEEE 802.11ax)</a:t>
+            </a:r>
+            <a:endParaRPr lang="en-US" dirty="0"/>
           </a:p>
         </p:txBody>
       </p:sp>
@@ -5599,7 +6456,50 @@
       </p:grpSpPr>
       <p:sp>
         <p:nvSpPr>
-          <p:cNvPr id="2" name="Title 1"/>
+          <p:cNvPr id="2" name="Content Placeholder 1"/>
+          <p:cNvSpPr>
+            <a:spLocks noGrp="1"/>
+          </p:cNvSpPr>
+          <p:nvPr>
+            <p:ph idx="1"/>
+          </p:nvPr>
+        </p:nvSpPr>
+        <p:spPr/>
+        <p:txBody>
+          <a:bodyPr/>
+          <a:lstStyle/>
+          <a:p>
+            <a:endParaRPr lang="en-US"/>
+          </a:p>
+        </p:txBody>
+      </p:sp>
+      <p:sp>
+        <p:nvSpPr>
+          <p:cNvPr id="3" name="Slide Number Placeholder 2"/>
+          <p:cNvSpPr>
+            <a:spLocks noGrp="1"/>
+          </p:cNvSpPr>
+          <p:nvPr>
+            <p:ph type="sldNum" sz="quarter" idx="4"/>
+          </p:nvPr>
+        </p:nvSpPr>
+        <p:spPr/>
+        <p:txBody>
+          <a:bodyPr/>
+          <a:lstStyle/>
+          <a:p>
+            <a:fld id="{DAF489CC-3B7A-4DA5-A8C0-4984788D0EC5}" type="slidenum">
+              <a:rPr lang="nl-NL" smtClean="0"/>
+              <a:pPr/>
+              <a:t>4</a:t>
+            </a:fld>
+            <a:endParaRPr lang="nl-NL" dirty="0"/>
+          </a:p>
+        </p:txBody>
+      </p:sp>
+      <p:sp>
+        <p:nvSpPr>
+          <p:cNvPr id="4" name="Title 3"/>
           <p:cNvSpPr>
             <a:spLocks noGrp="1"/>
           </p:cNvSpPr>
@@ -5612,18 +6512,55 @@
           <a:bodyPr/>
           <a:lstStyle/>
           <a:p>
-            <a:r>
-              <a:rPr lang="en-US" sz="4400" dirty="0" smtClean="0"/>
-              <a:t>Spatial Reuse in Wireless Networks</a:t>
-            </a:r>
-            <a:endParaRPr lang="en-US" sz="4400" dirty="0"/>
-          </a:p>
-        </p:txBody>
-      </p:sp>
+            <a:endParaRPr lang="en-US"/>
+          </a:p>
+        </p:txBody>
+      </p:sp>
+      <p:pic>
+        <p:nvPicPr>
+          <p:cNvPr id="2050" name="Picture 2" descr="http://www.isaziconsulting.co.za/images/MachineLearningDiagram.png"/>
+          <p:cNvPicPr>
+            <a:picLocks noChangeAspect="1" noChangeArrowheads="1"/>
+          </p:cNvPicPr>
+          <p:nvPr/>
+        </p:nvPicPr>
+        <p:blipFill>
+          <a:blip r:embed="rId2">
+            <a:extLst>
+              <a:ext uri="{28A0092B-C50C-407E-A947-70E740481C1C}">
+                <a14:useLocalDpi xmlns:a14="http://schemas.microsoft.com/office/drawing/2010/main" val="0"/>
+              </a:ext>
+            </a:extLst>
+          </a:blip>
+          <a:srcRect/>
+          <a:stretch>
+            <a:fillRect/>
+          </a:stretch>
+        </p:blipFill>
+        <p:spPr bwMode="auto">
+          <a:xfrm>
+            <a:off x="1187624" y="123478"/>
+            <a:ext cx="6511702" cy="4657870"/>
+          </a:xfrm>
+          <a:prstGeom prst="rect">
+            <a:avLst/>
+          </a:prstGeom>
+          <a:noFill/>
+          <a:extLst>
+            <a:ext uri="{909E8E84-426E-40DD-AFC4-6F175D3DCCD1}">
+              <a14:hiddenFill xmlns:a14="http://schemas.microsoft.com/office/drawing/2010/main">
+                <a:solidFill>
+                  <a:srgbClr val="FFFFFF"/>
+                </a:solidFill>
+              </a14:hiddenFill>
+            </a:ext>
+          </a:extLst>
+        </p:spPr>
+      </p:pic>
     </p:spTree>
     <p:extLst>
       <p:ext uri="{BB962C8B-B14F-4D97-AF65-F5344CB8AC3E}">
-        <p14:creationId xmlns:p14="http://schemas.microsoft.com/office/powerpoint/2010/main" val="1042083749"/>
+        <p14:creationId xmlns:p14="http://schemas.microsoft.com/office/powerpoint/2010/main" val="1315900965"/>
       </p:ext>
     </p:extLst>
   </p:cSld>
@@ -5652,25 +6589,6 @@
       </p:grpSpPr>
       <p:sp>
         <p:nvSpPr>
-          <p:cNvPr id="2" name="Content Placeholder 1"/>
-          <p:cNvSpPr>
-            <a:spLocks noGrp="1"/>
-          </p:cNvSpPr>
-          <p:nvPr>
-            <p:ph idx="1"/>
-          </p:nvPr>
-        </p:nvSpPr>
-        <p:spPr/>
-        <p:txBody>
-          <a:bodyPr/>
-          <a:lstStyle/>
-          <a:p>
-            <a:endParaRPr lang="en-US"/>
-          </a:p>
-        </p:txBody>
-      </p:sp>
-      <p:sp>
-        <p:nvSpPr>
           <p:cNvPr id="3" name="Slide Number Placeholder 2"/>
           <p:cNvSpPr>
             <a:spLocks noGrp="1"/>
@@ -5708,14 +6626,469 @@
           <a:bodyPr/>
           <a:lstStyle/>
           <a:p>
-            <a:endParaRPr lang="en-US"/>
-          </a:p>
-        </p:txBody>
-      </p:sp>
+            <a:r>
+              <a:rPr lang="en-US" dirty="0" smtClean="0"/>
+              <a:t>Main Problem</a:t>
+            </a:r>
+            <a:endParaRPr lang="en-US" dirty="0"/>
+          </a:p>
+        </p:txBody>
+      </p:sp>
+      <p:sp>
+        <p:nvSpPr>
+          <p:cNvPr id="9" name="Rectangle 8"/>
+          <p:cNvSpPr/>
+          <p:nvPr/>
+        </p:nvSpPr>
+        <p:spPr>
+          <a:xfrm>
+            <a:off x="3510368" y="1766704"/>
+            <a:ext cx="2160240" cy="1307880"/>
+          </a:xfrm>
+          <a:prstGeom prst="rect">
+            <a:avLst/>
+          </a:prstGeom>
+          <a:solidFill>
+            <a:srgbClr val="FF0000"/>
+          </a:solidFill>
+          <a:ln>
+            <a:solidFill>
+              <a:schemeClr val="tx1"/>
+            </a:solidFill>
+          </a:ln>
+        </p:spPr>
+        <p:style>
+          <a:lnRef idx="2">
+            <a:schemeClr val="accent1">
+              <a:shade val="50000"/>
+            </a:schemeClr>
+          </a:lnRef>
+          <a:fillRef idx="1">
+            <a:schemeClr val="accent1"/>
+          </a:fillRef>
+          <a:effectRef idx="0">
+            <a:schemeClr val="accent1"/>
+          </a:effectRef>
+          <a:fontRef idx="minor">
+            <a:schemeClr val="lt1"/>
+          </a:fontRef>
+        </p:style>
+        <p:txBody>
+          <a:bodyPr rtlCol="0" anchor="ctr"/>
+          <a:lstStyle/>
+          <a:p>
+            <a:pPr algn="ctr"/>
+            <a:r>
+              <a:rPr lang="en-US" sz="2400" b="1" dirty="0">
+                <a:latin typeface="Times New Roman" charset="0"/>
+                <a:ea typeface="Times New Roman" charset="0"/>
+                <a:cs typeface="Times New Roman" charset="0"/>
+              </a:rPr>
+              <a:t>Coexistence issues in WNs</a:t>
+            </a:r>
+          </a:p>
+        </p:txBody>
+      </p:sp>
+      <p:sp>
+        <p:nvSpPr>
+          <p:cNvPr id="13" name="Cube 12"/>
+          <p:cNvSpPr/>
+          <p:nvPr/>
+        </p:nvSpPr>
+        <p:spPr>
+          <a:xfrm>
+            <a:off x="6121144" y="110683"/>
+            <a:ext cx="2244282" cy="1820112"/>
+          </a:xfrm>
+          <a:prstGeom prst="cube">
+            <a:avLst>
+              <a:gd name="adj" fmla="val 9225"/>
+            </a:avLst>
+          </a:prstGeom>
+          <a:noFill/>
+          <a:ln>
+            <a:solidFill>
+              <a:srgbClr val="FF0000"/>
+            </a:solidFill>
+          </a:ln>
+        </p:spPr>
+        <p:style>
+          <a:lnRef idx="2">
+            <a:schemeClr val="accent1">
+              <a:shade val="50000"/>
+            </a:schemeClr>
+          </a:lnRef>
+          <a:fillRef idx="1">
+            <a:schemeClr val="accent1"/>
+          </a:fillRef>
+          <a:effectRef idx="0">
+            <a:schemeClr val="accent1"/>
+          </a:effectRef>
+          <a:fontRef idx="minor">
+            <a:schemeClr val="lt1"/>
+          </a:fontRef>
+        </p:style>
+        <p:txBody>
+          <a:bodyPr rtlCol="0" anchor="ctr"/>
+          <a:lstStyle/>
+          <a:p>
+            <a:pPr algn="ctr"/>
+            <a:r>
+              <a:rPr lang="en-US" dirty="0">
+                <a:solidFill>
+                  <a:schemeClr val="tx1"/>
+                </a:solidFill>
+                <a:latin typeface="Times New Roman" charset="0"/>
+                <a:ea typeface="Times New Roman" charset="0"/>
+                <a:cs typeface="Times New Roman" charset="0"/>
+              </a:rPr>
+              <a:t>Computational power moving to the cloud (more communication)</a:t>
+            </a:r>
+          </a:p>
+        </p:txBody>
+      </p:sp>
+      <p:sp>
+        <p:nvSpPr>
+          <p:cNvPr id="14" name="Cube 13"/>
+          <p:cNvSpPr/>
+          <p:nvPr/>
+        </p:nvSpPr>
+        <p:spPr>
+          <a:xfrm>
+            <a:off x="5796136" y="3171111"/>
+            <a:ext cx="2244282" cy="1080120"/>
+          </a:xfrm>
+          <a:prstGeom prst="cube">
+            <a:avLst>
+              <a:gd name="adj" fmla="val 9225"/>
+            </a:avLst>
+          </a:prstGeom>
+          <a:noFill/>
+          <a:ln>
+            <a:solidFill>
+              <a:srgbClr val="FF0000"/>
+            </a:solidFill>
+          </a:ln>
+        </p:spPr>
+        <p:style>
+          <a:lnRef idx="2">
+            <a:schemeClr val="accent1">
+              <a:shade val="50000"/>
+            </a:schemeClr>
+          </a:lnRef>
+          <a:fillRef idx="1">
+            <a:schemeClr val="accent1"/>
+          </a:fillRef>
+          <a:effectRef idx="0">
+            <a:schemeClr val="accent1"/>
+          </a:effectRef>
+          <a:fontRef idx="minor">
+            <a:schemeClr val="lt1"/>
+          </a:fontRef>
+        </p:style>
+        <p:txBody>
+          <a:bodyPr rtlCol="0" anchor="ctr"/>
+          <a:lstStyle/>
+          <a:p>
+            <a:pPr algn="ctr"/>
+            <a:r>
+              <a:rPr lang="en-US" dirty="0" smtClean="0">
+                <a:solidFill>
+                  <a:schemeClr val="tx1"/>
+                </a:solidFill>
+                <a:latin typeface="Times New Roman" charset="0"/>
+                <a:ea typeface="Times New Roman" charset="0"/>
+                <a:cs typeface="Times New Roman" charset="0"/>
+              </a:rPr>
+              <a:t>Heterogeneous deployments</a:t>
+            </a:r>
+            <a:endParaRPr lang="en-US" dirty="0">
+              <a:solidFill>
+                <a:schemeClr val="tx1"/>
+              </a:solidFill>
+              <a:latin typeface="Times New Roman" charset="0"/>
+              <a:ea typeface="Times New Roman" charset="0"/>
+              <a:cs typeface="Times New Roman" charset="0"/>
+            </a:endParaRPr>
+          </a:p>
+        </p:txBody>
+      </p:sp>
+      <p:sp>
+        <p:nvSpPr>
+          <p:cNvPr id="15" name="Cube 14"/>
+          <p:cNvSpPr/>
+          <p:nvPr/>
+        </p:nvSpPr>
+        <p:spPr>
+          <a:xfrm>
+            <a:off x="1259632" y="3171111"/>
+            <a:ext cx="2019014" cy="1166172"/>
+          </a:xfrm>
+          <a:prstGeom prst="cube">
+            <a:avLst>
+              <a:gd name="adj" fmla="val 9225"/>
+            </a:avLst>
+          </a:prstGeom>
+          <a:noFill/>
+          <a:ln>
+            <a:solidFill>
+              <a:srgbClr val="FF0000"/>
+            </a:solidFill>
+          </a:ln>
+        </p:spPr>
+        <p:style>
+          <a:lnRef idx="2">
+            <a:schemeClr val="accent1">
+              <a:shade val="50000"/>
+            </a:schemeClr>
+          </a:lnRef>
+          <a:fillRef idx="1">
+            <a:schemeClr val="accent1"/>
+          </a:fillRef>
+          <a:effectRef idx="0">
+            <a:schemeClr val="accent1"/>
+          </a:effectRef>
+          <a:fontRef idx="minor">
+            <a:schemeClr val="lt1"/>
+          </a:fontRef>
+        </p:style>
+        <p:txBody>
+          <a:bodyPr rtlCol="0" anchor="ctr"/>
+          <a:lstStyle/>
+          <a:p>
+            <a:pPr algn="ctr"/>
+            <a:r>
+              <a:rPr lang="en-US" dirty="0">
+                <a:solidFill>
+                  <a:schemeClr val="tx1"/>
+                </a:solidFill>
+                <a:latin typeface="Times New Roman" charset="0"/>
+                <a:ea typeface="Times New Roman" charset="0"/>
+                <a:cs typeface="Times New Roman" charset="0"/>
+              </a:rPr>
+              <a:t>New BW requirements of new apps</a:t>
+            </a:r>
+          </a:p>
+        </p:txBody>
+      </p:sp>
+      <p:sp>
+        <p:nvSpPr>
+          <p:cNvPr id="16" name="Cube 15"/>
+          <p:cNvSpPr/>
+          <p:nvPr/>
+        </p:nvSpPr>
+        <p:spPr>
+          <a:xfrm>
+            <a:off x="1135026" y="901414"/>
+            <a:ext cx="1800200" cy="1068566"/>
+          </a:xfrm>
+          <a:prstGeom prst="cube">
+            <a:avLst>
+              <a:gd name="adj" fmla="val 9225"/>
+            </a:avLst>
+          </a:prstGeom>
+          <a:noFill/>
+          <a:ln>
+            <a:solidFill>
+              <a:srgbClr val="FF0000"/>
+            </a:solidFill>
+          </a:ln>
+        </p:spPr>
+        <p:style>
+          <a:lnRef idx="2">
+            <a:schemeClr val="accent1">
+              <a:shade val="50000"/>
+            </a:schemeClr>
+          </a:lnRef>
+          <a:fillRef idx="1">
+            <a:schemeClr val="accent1"/>
+          </a:fillRef>
+          <a:effectRef idx="0">
+            <a:schemeClr val="accent1"/>
+          </a:effectRef>
+          <a:fontRef idx="minor">
+            <a:schemeClr val="lt1"/>
+          </a:fontRef>
+        </p:style>
+        <p:txBody>
+          <a:bodyPr rtlCol="0" anchor="ctr"/>
+          <a:lstStyle/>
+          <a:p>
+            <a:pPr algn="ctr"/>
+            <a:r>
+              <a:rPr lang="en-US" dirty="0">
+                <a:solidFill>
+                  <a:schemeClr val="tx1"/>
+                </a:solidFill>
+                <a:latin typeface="Times New Roman" charset="0"/>
+                <a:ea typeface="Times New Roman" charset="0"/>
+                <a:cs typeface="Times New Roman" charset="0"/>
+              </a:rPr>
+              <a:t>Easiness of deployments</a:t>
+            </a:r>
+          </a:p>
+        </p:txBody>
+      </p:sp>
+      <p:cxnSp>
+        <p:nvCxnSpPr>
+          <p:cNvPr id="17" name="Curved Connector 16"/>
+          <p:cNvCxnSpPr>
+            <a:stCxn id="16" idx="3"/>
+            <a:endCxn id="9" idx="1"/>
+          </p:cNvCxnSpPr>
+          <p:nvPr/>
+        </p:nvCxnSpPr>
+        <p:spPr>
+          <a:xfrm rot="16200000" flipH="1">
+            <a:off x="2522771" y="1433047"/>
+            <a:ext cx="450664" cy="1524530"/>
+          </a:xfrm>
+          <a:prstGeom prst="curvedConnector2">
+            <a:avLst/>
+          </a:prstGeom>
+          <a:ln w="38100">
+            <a:solidFill>
+              <a:schemeClr val="tx1"/>
+            </a:solidFill>
+            <a:tailEnd type="triangle"/>
+          </a:ln>
+        </p:spPr>
+        <p:style>
+          <a:lnRef idx="1">
+            <a:schemeClr val="accent1"/>
+          </a:lnRef>
+          <a:fillRef idx="0">
+            <a:schemeClr val="accent1"/>
+          </a:fillRef>
+          <a:effectRef idx="0">
+            <a:schemeClr val="accent1"/>
+          </a:effectRef>
+          <a:fontRef idx="minor">
+            <a:schemeClr val="tx1"/>
+          </a:fontRef>
+        </p:style>
+      </p:cxnSp>
+      <p:cxnSp>
+        <p:nvCxnSpPr>
+          <p:cNvPr id="20" name="Curved Connector 19"/>
+          <p:cNvCxnSpPr>
+            <a:stCxn id="15" idx="5"/>
+            <a:endCxn id="9" idx="2"/>
+          </p:cNvCxnSpPr>
+          <p:nvPr/>
+        </p:nvCxnSpPr>
+        <p:spPr>
+          <a:xfrm flipV="1">
+            <a:off x="3278646" y="3074584"/>
+            <a:ext cx="1311842" cy="625823"/>
+          </a:xfrm>
+          <a:prstGeom prst="curvedConnector2">
+            <a:avLst/>
+          </a:prstGeom>
+          <a:ln w="38100">
+            <a:solidFill>
+              <a:schemeClr val="tx1"/>
+            </a:solidFill>
+            <a:tailEnd type="triangle"/>
+          </a:ln>
+        </p:spPr>
+        <p:style>
+          <a:lnRef idx="1">
+            <a:schemeClr val="accent1"/>
+          </a:lnRef>
+          <a:fillRef idx="0">
+            <a:schemeClr val="accent1"/>
+          </a:fillRef>
+          <a:effectRef idx="0">
+            <a:schemeClr val="accent1"/>
+          </a:effectRef>
+          <a:fontRef idx="minor">
+            <a:schemeClr val="tx1"/>
+          </a:fontRef>
+        </p:style>
+      </p:cxnSp>
+      <p:cxnSp>
+        <p:nvCxnSpPr>
+          <p:cNvPr id="24" name="Curved Connector 23"/>
+          <p:cNvCxnSpPr>
+            <a:stCxn id="14" idx="0"/>
+            <a:endCxn id="9" idx="3"/>
+          </p:cNvCxnSpPr>
+          <p:nvPr/>
+        </p:nvCxnSpPr>
+        <p:spPr>
+          <a:xfrm rot="16200000" flipV="1">
+            <a:off x="5944120" y="2147133"/>
+            <a:ext cx="750467" cy="1297490"/>
+          </a:xfrm>
+          <a:prstGeom prst="curvedConnector2">
+            <a:avLst/>
+          </a:prstGeom>
+          <a:ln w="38100">
+            <a:solidFill>
+              <a:schemeClr val="tx1"/>
+            </a:solidFill>
+            <a:tailEnd type="triangle"/>
+          </a:ln>
+        </p:spPr>
+        <p:style>
+          <a:lnRef idx="1">
+            <a:schemeClr val="accent1"/>
+          </a:lnRef>
+          <a:fillRef idx="0">
+            <a:schemeClr val="accent1"/>
+          </a:fillRef>
+          <a:effectRef idx="0">
+            <a:schemeClr val="accent1"/>
+          </a:effectRef>
+          <a:fontRef idx="minor">
+            <a:schemeClr val="tx1"/>
+          </a:fontRef>
+        </p:style>
+      </p:cxnSp>
+      <p:cxnSp>
+        <p:nvCxnSpPr>
+          <p:cNvPr id="27" name="Curved Connector 26"/>
+          <p:cNvCxnSpPr>
+            <a:stCxn id="13" idx="2"/>
+            <a:endCxn id="9" idx="0"/>
+          </p:cNvCxnSpPr>
+          <p:nvPr/>
+        </p:nvCxnSpPr>
+        <p:spPr>
+          <a:xfrm rot="10800000" flipV="1">
+            <a:off x="4590488" y="1104692"/>
+            <a:ext cx="1530656" cy="662012"/>
+          </a:xfrm>
+          <a:prstGeom prst="curvedConnector2">
+            <a:avLst/>
+          </a:prstGeom>
+          <a:ln w="38100">
+            <a:solidFill>
+              <a:schemeClr val="tx1"/>
+            </a:solidFill>
+            <a:tailEnd type="triangle"/>
+          </a:ln>
+        </p:spPr>
+        <p:style>
+          <a:lnRef idx="1">
+            <a:schemeClr val="accent1"/>
+          </a:lnRef>
+          <a:fillRef idx="0">
+            <a:schemeClr val="accent1"/>
+          </a:fillRef>
+          <a:effectRef idx="0">
+            <a:schemeClr val="accent1"/>
+          </a:effectRef>
+          <a:fontRef idx="minor">
+            <a:schemeClr val="tx1"/>
+          </a:fontRef>
+        </p:style>
+      </p:cxnSp>
     </p:spTree>
     <p:extLst>
       <p:ext uri="{BB962C8B-B14F-4D97-AF65-F5344CB8AC3E}">
-        <p14:creationId xmlns:p14="http://schemas.microsoft.com/office/powerpoint/2010/main" val="160779116"/>
+        <p14:creationId xmlns:p14="http://schemas.microsoft.com/office/powerpoint/2010/main" val="242349684"/>
       </p:ext>
     </p:extLst>
   </p:cSld>
@@ -5744,7 +7117,31 @@
       </p:grpSpPr>
       <p:sp>
         <p:nvSpPr>
-          <p:cNvPr id="2" name="Title 1"/>
+          <p:cNvPr id="3" name="Slide Number Placeholder 2"/>
+          <p:cNvSpPr>
+            <a:spLocks noGrp="1"/>
+          </p:cNvSpPr>
+          <p:nvPr>
+            <p:ph type="sldNum" sz="quarter" idx="4"/>
+          </p:nvPr>
+        </p:nvSpPr>
+        <p:spPr/>
+        <p:txBody>
+          <a:bodyPr/>
+          <a:lstStyle/>
+          <a:p>
+            <a:fld id="{DAF489CC-3B7A-4DA5-A8C0-4984788D0EC5}" type="slidenum">
+              <a:rPr lang="nl-NL" smtClean="0"/>
+              <a:pPr/>
+              <a:t>6</a:t>
+            </a:fld>
+            <a:endParaRPr lang="nl-NL" dirty="0"/>
+          </a:p>
+        </p:txBody>
+      </p:sp>
+      <p:sp>
+        <p:nvSpPr>
+          <p:cNvPr id="4" name="Title 3"/>
           <p:cNvSpPr>
             <a:spLocks noGrp="1"/>
           </p:cNvSpPr>
@@ -5758,17 +7155,578 @@
           <a:lstStyle/>
           <a:p>
             <a:r>
-              <a:rPr lang="en-US" sz="4400" dirty="0" smtClean="0"/>
-              <a:t>Problem Formulation</a:t>
-            </a:r>
-            <a:endParaRPr lang="en-US" sz="4400" dirty="0"/>
-          </a:p>
-        </p:txBody>
-      </p:sp>
+              <a:rPr lang="en-US" dirty="0" smtClean="0"/>
+              <a:t>Main Solutions</a:t>
+            </a:r>
+            <a:endParaRPr lang="en-US" dirty="0"/>
+          </a:p>
+        </p:txBody>
+      </p:sp>
+      <p:sp>
+        <p:nvSpPr>
+          <p:cNvPr id="9" name="TextBox 8"/>
+          <p:cNvSpPr txBox="1"/>
+          <p:nvPr/>
+        </p:nvSpPr>
+        <p:spPr>
+          <a:xfrm>
+            <a:off x="4136571" y="1407886"/>
+            <a:ext cx="184731" cy="369332"/>
+          </a:xfrm>
+          <a:prstGeom prst="rect">
+            <a:avLst/>
+          </a:prstGeom>
+          <a:noFill/>
+        </p:spPr>
+        <p:txBody>
+          <a:bodyPr wrap="none" rtlCol="0">
+            <a:spAutoFit/>
+          </a:bodyPr>
+          <a:lstStyle/>
+          <a:p>
+            <a:endParaRPr lang="en-US" dirty="0"/>
+          </a:p>
+        </p:txBody>
+      </p:sp>
+      <p:sp>
+        <p:nvSpPr>
+          <p:cNvPr id="2" name="Cube 1"/>
+          <p:cNvSpPr/>
+          <p:nvPr/>
+        </p:nvSpPr>
+        <p:spPr>
+          <a:xfrm>
+            <a:off x="568490" y="1592552"/>
+            <a:ext cx="2197847" cy="1656184"/>
+          </a:xfrm>
+          <a:prstGeom prst="cube">
+            <a:avLst>
+              <a:gd name="adj" fmla="val 9225"/>
+            </a:avLst>
+          </a:prstGeom>
+          <a:solidFill>
+            <a:schemeClr val="accent1">
+              <a:lumMod val="60000"/>
+              <a:lumOff val="40000"/>
+            </a:schemeClr>
+          </a:solidFill>
+          <a:ln>
+            <a:solidFill>
+              <a:schemeClr val="tx1"/>
+            </a:solidFill>
+          </a:ln>
+        </p:spPr>
+        <p:style>
+          <a:lnRef idx="2">
+            <a:schemeClr val="accent1">
+              <a:shade val="50000"/>
+            </a:schemeClr>
+          </a:lnRef>
+          <a:fillRef idx="1">
+            <a:schemeClr val="accent1"/>
+          </a:fillRef>
+          <a:effectRef idx="0">
+            <a:schemeClr val="accent1"/>
+          </a:effectRef>
+          <a:fontRef idx="minor">
+            <a:schemeClr val="lt1"/>
+          </a:fontRef>
+        </p:style>
+        <p:txBody>
+          <a:bodyPr rtlCol="0" anchor="ctr"/>
+          <a:lstStyle/>
+          <a:p>
+            <a:pPr algn="ctr"/>
+            <a:r>
+              <a:rPr lang="en-US" b="1" dirty="0" smtClean="0">
+                <a:solidFill>
+                  <a:schemeClr val="tx1"/>
+                </a:solidFill>
+                <a:latin typeface="Times New Roman" charset="0"/>
+                <a:ea typeface="Times New Roman" charset="0"/>
+                <a:cs typeface="Times New Roman" charset="0"/>
+              </a:rPr>
+              <a:t>Space</a:t>
+            </a:r>
+            <a:endParaRPr lang="en-US" b="1" dirty="0">
+              <a:solidFill>
+                <a:schemeClr val="tx1"/>
+              </a:solidFill>
+              <a:latin typeface="Times New Roman" charset="0"/>
+              <a:ea typeface="Times New Roman" charset="0"/>
+              <a:cs typeface="Times New Roman" charset="0"/>
+            </a:endParaRPr>
+          </a:p>
+          <a:p>
+            <a:pPr marL="285750" indent="-285750">
+              <a:buFont typeface="Arial" charset="0"/>
+              <a:buChar char="•"/>
+            </a:pPr>
+            <a:r>
+              <a:rPr lang="en-US" dirty="0">
+                <a:solidFill>
+                  <a:schemeClr val="tx1"/>
+                </a:solidFill>
+                <a:latin typeface="Times New Roman" charset="0"/>
+                <a:ea typeface="Times New Roman" charset="0"/>
+                <a:cs typeface="Times New Roman" charset="0"/>
+              </a:rPr>
+              <a:t>TPC</a:t>
+            </a:r>
+          </a:p>
+          <a:p>
+            <a:pPr marL="285750" indent="-285750">
+              <a:buFont typeface="Arial" charset="0"/>
+              <a:buChar char="•"/>
+            </a:pPr>
+            <a:r>
+              <a:rPr lang="en-US" dirty="0">
+                <a:solidFill>
+                  <a:schemeClr val="tx1"/>
+                </a:solidFill>
+                <a:latin typeface="Times New Roman" charset="0"/>
+                <a:ea typeface="Times New Roman" charset="0"/>
+                <a:cs typeface="Times New Roman" charset="0"/>
+              </a:rPr>
+              <a:t>CST </a:t>
+            </a:r>
+            <a:r>
+              <a:rPr lang="en-US" dirty="0" smtClean="0">
+                <a:solidFill>
+                  <a:schemeClr val="tx1"/>
+                </a:solidFill>
+                <a:latin typeface="Times New Roman" charset="0"/>
+                <a:ea typeface="Times New Roman" charset="0"/>
+                <a:cs typeface="Times New Roman" charset="0"/>
+              </a:rPr>
+              <a:t>adjustment</a:t>
+            </a:r>
+          </a:p>
+          <a:p>
+            <a:pPr marL="285750" indent="-285750">
+              <a:buFont typeface="Arial" charset="0"/>
+              <a:buChar char="•"/>
+            </a:pPr>
+            <a:r>
+              <a:rPr lang="en-US" dirty="0" err="1" smtClean="0">
+                <a:solidFill>
+                  <a:schemeClr val="tx1"/>
+                </a:solidFill>
+                <a:latin typeface="Times New Roman" charset="0"/>
+                <a:ea typeface="Times New Roman" charset="0"/>
+                <a:cs typeface="Times New Roman" charset="0"/>
+              </a:rPr>
+              <a:t>Beamforming</a:t>
+            </a:r>
+            <a:endParaRPr lang="en-US" dirty="0">
+              <a:solidFill>
+                <a:schemeClr val="tx1"/>
+              </a:solidFill>
+              <a:latin typeface="Times New Roman" charset="0"/>
+              <a:ea typeface="Times New Roman" charset="0"/>
+              <a:cs typeface="Times New Roman" charset="0"/>
+            </a:endParaRPr>
+          </a:p>
+        </p:txBody>
+      </p:sp>
+      <p:sp>
+        <p:nvSpPr>
+          <p:cNvPr id="10" name="Cube 9"/>
+          <p:cNvSpPr/>
+          <p:nvPr/>
+        </p:nvSpPr>
+        <p:spPr>
+          <a:xfrm>
+            <a:off x="6432174" y="664469"/>
+            <a:ext cx="2058008" cy="1279121"/>
+          </a:xfrm>
+          <a:prstGeom prst="cube">
+            <a:avLst>
+              <a:gd name="adj" fmla="val 9225"/>
+            </a:avLst>
+          </a:prstGeom>
+          <a:solidFill>
+            <a:srgbClr val="00B050"/>
+          </a:solidFill>
+          <a:ln>
+            <a:solidFill>
+              <a:schemeClr val="tx1"/>
+            </a:solidFill>
+          </a:ln>
+        </p:spPr>
+        <p:style>
+          <a:lnRef idx="2">
+            <a:schemeClr val="accent1">
+              <a:shade val="50000"/>
+            </a:schemeClr>
+          </a:lnRef>
+          <a:fillRef idx="1">
+            <a:schemeClr val="accent1"/>
+          </a:fillRef>
+          <a:effectRef idx="0">
+            <a:schemeClr val="accent1"/>
+          </a:effectRef>
+          <a:fontRef idx="minor">
+            <a:schemeClr val="lt1"/>
+          </a:fontRef>
+        </p:style>
+        <p:txBody>
+          <a:bodyPr rtlCol="0" anchor="ctr"/>
+          <a:lstStyle/>
+          <a:p>
+            <a:pPr algn="ctr"/>
+            <a:r>
+              <a:rPr lang="en-US" b="1" dirty="0" smtClean="0">
+                <a:solidFill>
+                  <a:schemeClr val="tx1"/>
+                </a:solidFill>
+                <a:latin typeface="Times New Roman" charset="0"/>
+                <a:ea typeface="Times New Roman" charset="0"/>
+                <a:cs typeface="Times New Roman" charset="0"/>
+              </a:rPr>
+              <a:t>Frequency</a:t>
+            </a:r>
+            <a:endParaRPr lang="en-US" b="1" dirty="0">
+              <a:solidFill>
+                <a:schemeClr val="tx1"/>
+              </a:solidFill>
+              <a:latin typeface="Times New Roman" charset="0"/>
+              <a:ea typeface="Times New Roman" charset="0"/>
+              <a:cs typeface="Times New Roman" charset="0"/>
+            </a:endParaRPr>
+          </a:p>
+          <a:p>
+            <a:pPr marL="285750" indent="-285750">
+              <a:buFont typeface="Arial" charset="0"/>
+              <a:buChar char="•"/>
+            </a:pPr>
+            <a:r>
+              <a:rPr lang="en-US" dirty="0" smtClean="0">
+                <a:solidFill>
+                  <a:schemeClr val="tx1"/>
+                </a:solidFill>
+                <a:latin typeface="Times New Roman" charset="0"/>
+                <a:ea typeface="Times New Roman" charset="0"/>
+                <a:cs typeface="Times New Roman" charset="0"/>
+              </a:rPr>
+              <a:t>DSA</a:t>
+            </a:r>
+          </a:p>
+          <a:p>
+            <a:pPr marL="285750" indent="-285750">
+              <a:buFont typeface="Arial" charset="0"/>
+              <a:buChar char="•"/>
+            </a:pPr>
+            <a:r>
+              <a:rPr lang="en-US" dirty="0" smtClean="0">
+                <a:solidFill>
+                  <a:schemeClr val="tx1"/>
+                </a:solidFill>
+                <a:latin typeface="Times New Roman" charset="0"/>
+                <a:ea typeface="Times New Roman" charset="0"/>
+                <a:cs typeface="Times New Roman" charset="0"/>
+              </a:rPr>
+              <a:t>DCA</a:t>
+            </a:r>
+            <a:endParaRPr lang="en-US" dirty="0">
+              <a:solidFill>
+                <a:schemeClr val="tx1"/>
+              </a:solidFill>
+              <a:latin typeface="Times New Roman" charset="0"/>
+              <a:ea typeface="Times New Roman" charset="0"/>
+              <a:cs typeface="Times New Roman" charset="0"/>
+            </a:endParaRPr>
+          </a:p>
+        </p:txBody>
+      </p:sp>
+      <p:sp>
+        <p:nvSpPr>
+          <p:cNvPr id="14" name="Cube 13"/>
+          <p:cNvSpPr/>
+          <p:nvPr/>
+        </p:nvSpPr>
+        <p:spPr>
+          <a:xfrm>
+            <a:off x="5528191" y="3358367"/>
+            <a:ext cx="2232248" cy="1185822"/>
+          </a:xfrm>
+          <a:prstGeom prst="cube">
+            <a:avLst>
+              <a:gd name="adj" fmla="val 9225"/>
+            </a:avLst>
+          </a:prstGeom>
+          <a:solidFill>
+            <a:srgbClr val="FFFF00"/>
+          </a:solidFill>
+          <a:ln>
+            <a:solidFill>
+              <a:schemeClr val="tx1"/>
+            </a:solidFill>
+          </a:ln>
+        </p:spPr>
+        <p:style>
+          <a:lnRef idx="2">
+            <a:schemeClr val="accent1">
+              <a:shade val="50000"/>
+            </a:schemeClr>
+          </a:lnRef>
+          <a:fillRef idx="1">
+            <a:schemeClr val="accent1"/>
+          </a:fillRef>
+          <a:effectRef idx="0">
+            <a:schemeClr val="accent1"/>
+          </a:effectRef>
+          <a:fontRef idx="minor">
+            <a:schemeClr val="lt1"/>
+          </a:fontRef>
+        </p:style>
+        <p:txBody>
+          <a:bodyPr rtlCol="0" anchor="ctr"/>
+          <a:lstStyle/>
+          <a:p>
+            <a:pPr algn="ctr"/>
+            <a:r>
+              <a:rPr lang="en-US" b="1" dirty="0" smtClean="0">
+                <a:solidFill>
+                  <a:schemeClr val="tx1"/>
+                </a:solidFill>
+                <a:latin typeface="Times New Roman" charset="0"/>
+                <a:ea typeface="Times New Roman" charset="0"/>
+                <a:cs typeface="Times New Roman" charset="0"/>
+              </a:rPr>
+              <a:t>Time</a:t>
+            </a:r>
+            <a:endParaRPr lang="en-US" b="1" dirty="0">
+              <a:solidFill>
+                <a:schemeClr val="tx1"/>
+              </a:solidFill>
+              <a:latin typeface="Times New Roman" charset="0"/>
+              <a:ea typeface="Times New Roman" charset="0"/>
+              <a:cs typeface="Times New Roman" charset="0"/>
+            </a:endParaRPr>
+          </a:p>
+          <a:p>
+            <a:pPr marL="285750" indent="-285750">
+              <a:buFont typeface="Arial" charset="0"/>
+              <a:buChar char="•"/>
+            </a:pPr>
+            <a:r>
+              <a:rPr lang="en-US" dirty="0" smtClean="0">
+                <a:solidFill>
+                  <a:schemeClr val="tx1"/>
+                </a:solidFill>
+                <a:latin typeface="Times New Roman" charset="0"/>
+                <a:ea typeface="Times New Roman" charset="0"/>
+                <a:cs typeface="Times New Roman" charset="0"/>
+              </a:rPr>
+              <a:t>Scheduling</a:t>
+            </a:r>
+          </a:p>
+          <a:p>
+            <a:pPr marL="285750" indent="-285750">
+              <a:buFont typeface="Arial" charset="0"/>
+              <a:buChar char="•"/>
+            </a:pPr>
+            <a:r>
+              <a:rPr lang="en-US" dirty="0" smtClean="0">
+                <a:solidFill>
+                  <a:schemeClr val="tx1"/>
+                </a:solidFill>
+                <a:latin typeface="Times New Roman" charset="0"/>
+                <a:ea typeface="Times New Roman" charset="0"/>
+                <a:cs typeface="Times New Roman" charset="0"/>
+              </a:rPr>
+              <a:t>FT-CSMA/CA</a:t>
+            </a:r>
+            <a:endParaRPr lang="en-US" dirty="0">
+              <a:solidFill>
+                <a:schemeClr val="tx1"/>
+              </a:solidFill>
+              <a:latin typeface="Times New Roman" charset="0"/>
+              <a:ea typeface="Times New Roman" charset="0"/>
+              <a:cs typeface="Times New Roman" charset="0"/>
+            </a:endParaRPr>
+          </a:p>
+        </p:txBody>
+      </p:sp>
+      <p:sp>
+        <p:nvSpPr>
+          <p:cNvPr id="20" name="Rectangle 19"/>
+          <p:cNvSpPr/>
+          <p:nvPr/>
+        </p:nvSpPr>
+        <p:spPr>
+          <a:xfrm>
+            <a:off x="3510368" y="1766704"/>
+            <a:ext cx="2160240" cy="1307880"/>
+          </a:xfrm>
+          <a:prstGeom prst="rect">
+            <a:avLst/>
+          </a:prstGeom>
+          <a:solidFill>
+            <a:srgbClr val="FF0000"/>
+          </a:solidFill>
+          <a:ln>
+            <a:solidFill>
+              <a:schemeClr val="tx1"/>
+            </a:solidFill>
+          </a:ln>
+        </p:spPr>
+        <p:style>
+          <a:lnRef idx="2">
+            <a:schemeClr val="accent1">
+              <a:shade val="50000"/>
+            </a:schemeClr>
+          </a:lnRef>
+          <a:fillRef idx="1">
+            <a:schemeClr val="accent1"/>
+          </a:fillRef>
+          <a:effectRef idx="0">
+            <a:schemeClr val="accent1"/>
+          </a:effectRef>
+          <a:fontRef idx="minor">
+            <a:schemeClr val="lt1"/>
+          </a:fontRef>
+        </p:style>
+        <p:txBody>
+          <a:bodyPr rtlCol="0" anchor="ctr"/>
+          <a:lstStyle/>
+          <a:p>
+            <a:pPr algn="ctr"/>
+            <a:r>
+              <a:rPr lang="en-US" sz="2400" b="1" dirty="0">
+                <a:latin typeface="Times New Roman" charset="0"/>
+                <a:ea typeface="Times New Roman" charset="0"/>
+                <a:cs typeface="Times New Roman" charset="0"/>
+              </a:rPr>
+              <a:t>Coexistence issues in WNs</a:t>
+            </a:r>
+          </a:p>
+        </p:txBody>
+      </p:sp>
+      <p:cxnSp>
+        <p:nvCxnSpPr>
+          <p:cNvPr id="28" name="Curved Connector 27"/>
+          <p:cNvCxnSpPr>
+            <a:stCxn id="20" idx="2"/>
+            <a:endCxn id="2" idx="3"/>
+          </p:cNvCxnSpPr>
+          <p:nvPr/>
+        </p:nvCxnSpPr>
+        <p:spPr>
+          <a:xfrm rot="5400000">
+            <a:off x="3003679" y="1661927"/>
+            <a:ext cx="174152" cy="2999466"/>
+          </a:xfrm>
+          <a:prstGeom prst="curvedConnector3">
+            <a:avLst>
+              <a:gd name="adj1" fmla="val 431287"/>
+            </a:avLst>
+          </a:prstGeom>
+          <a:ln w="38100">
+            <a:solidFill>
+              <a:schemeClr val="tx1"/>
+            </a:solidFill>
+            <a:tailEnd type="triangle"/>
+          </a:ln>
+        </p:spPr>
+        <p:style>
+          <a:lnRef idx="1">
+            <a:schemeClr val="accent1"/>
+          </a:lnRef>
+          <a:fillRef idx="0">
+            <a:schemeClr val="accent1"/>
+          </a:fillRef>
+          <a:effectRef idx="0">
+            <a:schemeClr val="accent1"/>
+          </a:effectRef>
+          <a:fontRef idx="minor">
+            <a:schemeClr val="tx1"/>
+          </a:fontRef>
+        </p:style>
+      </p:cxnSp>
+      <p:cxnSp>
+        <p:nvCxnSpPr>
+          <p:cNvPr id="32" name="Curved Connector 31"/>
+          <p:cNvCxnSpPr>
+            <a:stCxn id="20" idx="3"/>
+            <a:endCxn id="14" idx="0"/>
+          </p:cNvCxnSpPr>
+          <p:nvPr/>
+        </p:nvCxnSpPr>
+        <p:spPr>
+          <a:xfrm>
+            <a:off x="5670608" y="2420644"/>
+            <a:ext cx="1028403" cy="937723"/>
+          </a:xfrm>
+          <a:prstGeom prst="curvedConnector2">
+            <a:avLst/>
+          </a:prstGeom>
+          <a:ln w="38100">
+            <a:solidFill>
+              <a:schemeClr val="tx1"/>
+            </a:solidFill>
+            <a:tailEnd type="triangle"/>
+          </a:ln>
+        </p:spPr>
+        <p:style>
+          <a:lnRef idx="1">
+            <a:schemeClr val="accent1"/>
+          </a:lnRef>
+          <a:fillRef idx="0">
+            <a:schemeClr val="accent1"/>
+          </a:fillRef>
+          <a:effectRef idx="0">
+            <a:schemeClr val="accent1"/>
+          </a:effectRef>
+          <a:fontRef idx="minor">
+            <a:schemeClr val="tx1"/>
+          </a:fontRef>
+        </p:style>
+      </p:cxnSp>
+      <p:cxnSp>
+        <p:nvCxnSpPr>
+          <p:cNvPr id="37" name="Curved Connector 36"/>
+          <p:cNvCxnSpPr>
+            <a:stCxn id="20" idx="0"/>
+            <a:endCxn id="10" idx="2"/>
+          </p:cNvCxnSpPr>
+          <p:nvPr/>
+        </p:nvCxnSpPr>
+        <p:spPr>
+          <a:xfrm rot="5400000" flipH="1" flipV="1">
+            <a:off x="5309494" y="644024"/>
+            <a:ext cx="403675" cy="1841686"/>
+          </a:xfrm>
+          <a:prstGeom prst="curvedConnector2">
+            <a:avLst/>
+          </a:prstGeom>
+          <a:ln w="38100">
+            <a:solidFill>
+              <a:schemeClr val="tx1"/>
+            </a:solidFill>
+            <a:tailEnd type="triangle"/>
+          </a:ln>
+        </p:spPr>
+        <p:style>
+          <a:lnRef idx="1">
+            <a:schemeClr val="accent1"/>
+          </a:lnRef>
+          <a:fillRef idx="0">
+            <a:schemeClr val="accent1"/>
+          </a:fillRef>
+          <a:effectRef idx="0">
+            <a:schemeClr val="accent1"/>
+          </a:effectRef>
+          <a:fontRef idx="minor">
+            <a:schemeClr val="tx1"/>
+          </a:fontRef>
+        </p:style>
+      </p:cxnSp>
     </p:spTree>
     <p:extLst>
       <p:ext uri="{BB962C8B-B14F-4D97-AF65-F5344CB8AC3E}">
-        <p14:creationId xmlns:p14="http://schemas.microsoft.com/office/powerpoint/2010/main" val="680174686"/>
+        <p14:creationId xmlns:p14="http://schemas.microsoft.com/office/powerpoint/2010/main" val="626698597"/>
       </p:ext>
     </p:extLst>
   </p:cSld>
@@ -5797,50 +7755,7 @@
       </p:grpSpPr>
       <p:sp>
         <p:nvSpPr>
-          <p:cNvPr id="2" name="Content Placeholder 1"/>
-          <p:cNvSpPr>
-            <a:spLocks noGrp="1"/>
-          </p:cNvSpPr>
-          <p:nvPr>
-            <p:ph idx="1"/>
-          </p:nvPr>
-        </p:nvSpPr>
-        <p:spPr/>
-        <p:txBody>
-          <a:bodyPr/>
-          <a:lstStyle/>
-          <a:p>
-            <a:endParaRPr lang="en-US"/>
-          </a:p>
-        </p:txBody>
-      </p:sp>
-      <p:sp>
-        <p:nvSpPr>
-          <p:cNvPr id="3" name="Slide Number Placeholder 2"/>
-          <p:cNvSpPr>
-            <a:spLocks noGrp="1"/>
-          </p:cNvSpPr>
-          <p:nvPr>
-            <p:ph type="sldNum" sz="quarter" idx="4"/>
-          </p:nvPr>
-        </p:nvSpPr>
-        <p:spPr/>
-        <p:txBody>
-          <a:bodyPr/>
-          <a:lstStyle/>
-          <a:p>
-            <a:fld id="{DAF489CC-3B7A-4DA5-A8C0-4984788D0EC5}" type="slidenum">
-              <a:rPr lang="nl-NL" smtClean="0"/>
-              <a:pPr/>
-              <a:t>7</a:t>
-            </a:fld>
-            <a:endParaRPr lang="nl-NL" dirty="0"/>
-          </a:p>
-        </p:txBody>
-      </p:sp>
-      <p:sp>
-        <p:nvSpPr>
-          <p:cNvPr id="4" name="Title 3"/>
+          <p:cNvPr id="2" name="Title 1"/>
           <p:cNvSpPr>
             <a:spLocks noGrp="1"/>
           </p:cNvSpPr>
@@ -5853,14 +7768,18 @@
           <a:bodyPr/>
           <a:lstStyle/>
           <a:p>
-            <a:endParaRPr lang="en-US"/>
+            <a:r>
+              <a:rPr lang="en-US" sz="4400" dirty="0" smtClean="0"/>
+              <a:t>Spatial Reuse in Wireless Networks</a:t>
+            </a:r>
+            <a:endParaRPr lang="en-US" sz="4400" dirty="0"/>
           </a:p>
         </p:txBody>
       </p:sp>
     </p:spTree>
     <p:extLst>
       <p:ext uri="{BB962C8B-B14F-4D97-AF65-F5344CB8AC3E}">
-        <p14:creationId xmlns:p14="http://schemas.microsoft.com/office/powerpoint/2010/main" val="640494621"/>
+        <p14:creationId xmlns:p14="http://schemas.microsoft.com/office/powerpoint/2010/main" val="1042083749"/>
       </p:ext>
     </p:extLst>
   </p:cSld>
@@ -5889,7 +7808,50 @@
       </p:grpSpPr>
       <p:sp>
         <p:nvSpPr>
-          <p:cNvPr id="2" name="Title 1"/>
+          <p:cNvPr id="2" name="Content Placeholder 1"/>
+          <p:cNvSpPr>
+            <a:spLocks noGrp="1"/>
+          </p:cNvSpPr>
+          <p:nvPr>
+            <p:ph idx="1"/>
+          </p:nvPr>
+        </p:nvSpPr>
+        <p:spPr/>
+        <p:txBody>
+          <a:bodyPr/>
+          <a:lstStyle/>
+          <a:p>
+            <a:endParaRPr lang="en-US"/>
+          </a:p>
+        </p:txBody>
+      </p:sp>
+      <p:sp>
+        <p:nvSpPr>
+          <p:cNvPr id="3" name="Slide Number Placeholder 2"/>
+          <p:cNvSpPr>
+            <a:spLocks noGrp="1"/>
+          </p:cNvSpPr>
+          <p:nvPr>
+            <p:ph type="sldNum" sz="quarter" idx="4"/>
+          </p:nvPr>
+        </p:nvSpPr>
+        <p:spPr/>
+        <p:txBody>
+          <a:bodyPr/>
+          <a:lstStyle/>
+          <a:p>
+            <a:fld id="{DAF489CC-3B7A-4DA5-A8C0-4984788D0EC5}" type="slidenum">
+              <a:rPr lang="nl-NL" smtClean="0"/>
+              <a:pPr/>
+              <a:t>8</a:t>
+            </a:fld>
+            <a:endParaRPr lang="nl-NL" dirty="0"/>
+          </a:p>
+        </p:txBody>
+      </p:sp>
+      <p:sp>
+        <p:nvSpPr>
+          <p:cNvPr id="4" name="Title 3"/>
           <p:cNvSpPr>
             <a:spLocks noGrp="1"/>
           </p:cNvSpPr>
@@ -5897,28 +7859,19 @@
             <p:ph type="title"/>
           </p:nvPr>
         </p:nvSpPr>
-        <p:spPr>
-          <a:xfrm>
-            <a:off x="3131840" y="1995686"/>
-            <a:ext cx="5472608" cy="1080120"/>
-          </a:xfrm>
-        </p:spPr>
+        <p:spPr/>
         <p:txBody>
           <a:bodyPr/>
           <a:lstStyle/>
           <a:p>
-            <a:r>
-              <a:rPr lang="en-US" sz="4400" dirty="0" smtClean="0"/>
-              <a:t>Reinforcement Learning in WNs</a:t>
-            </a:r>
-            <a:endParaRPr lang="en-US" sz="4400" dirty="0"/>
+            <a:endParaRPr lang="en-US"/>
           </a:p>
         </p:txBody>
       </p:sp>
     </p:spTree>
     <p:extLst>
       <p:ext uri="{BB962C8B-B14F-4D97-AF65-F5344CB8AC3E}">
-        <p14:creationId xmlns:p14="http://schemas.microsoft.com/office/powerpoint/2010/main" val="1605056383"/>
+        <p14:creationId xmlns:p14="http://schemas.microsoft.com/office/powerpoint/2010/main" val="160779116"/>
       </p:ext>
     </p:extLst>
   </p:cSld>
@@ -5947,50 +7900,7 @@
       </p:grpSpPr>
       <p:sp>
         <p:nvSpPr>
-          <p:cNvPr id="2" name="Content Placeholder 1"/>
-          <p:cNvSpPr>
-            <a:spLocks noGrp="1"/>
-          </p:cNvSpPr>
-          <p:nvPr>
-            <p:ph idx="1"/>
-          </p:nvPr>
-        </p:nvSpPr>
-        <p:spPr/>
-        <p:txBody>
-          <a:bodyPr/>
-          <a:lstStyle/>
-          <a:p>
-            <a:endParaRPr lang="en-US"/>
-          </a:p>
-        </p:txBody>
-      </p:sp>
-      <p:sp>
-        <p:nvSpPr>
-          <p:cNvPr id="3" name="Slide Number Placeholder 2"/>
-          <p:cNvSpPr>
-            <a:spLocks noGrp="1"/>
-          </p:cNvSpPr>
-          <p:nvPr>
-            <p:ph type="sldNum" sz="quarter" idx="4"/>
-          </p:nvPr>
-        </p:nvSpPr>
-        <p:spPr/>
-        <p:txBody>
-          <a:bodyPr/>
-          <a:lstStyle/>
-          <a:p>
-            <a:fld id="{DAF489CC-3B7A-4DA5-A8C0-4984788D0EC5}" type="slidenum">
-              <a:rPr lang="nl-NL" smtClean="0"/>
-              <a:pPr/>
-              <a:t>9</a:t>
-            </a:fld>
-            <a:endParaRPr lang="nl-NL" dirty="0"/>
-          </a:p>
-        </p:txBody>
-      </p:sp>
-      <p:sp>
-        <p:nvSpPr>
-          <p:cNvPr id="4" name="Title 3"/>
+          <p:cNvPr id="2" name="Title 1"/>
           <p:cNvSpPr>
             <a:spLocks noGrp="1"/>
           </p:cNvSpPr>
@@ -6004,25 +7914,17 @@
           <a:lstStyle/>
           <a:p>
             <a:r>
-              <a:rPr lang="en-US" dirty="0" smtClean="0"/>
-              <a:t>RL in WNs </a:t>
-            </a:r>
-            <a:r>
-              <a:rPr lang="mr-IN" dirty="0" smtClean="0"/>
-              <a:t>–</a:t>
-            </a:r>
-            <a:r>
-              <a:rPr lang="en-US" dirty="0" smtClean="0"/>
-              <a:t> State-of-the-Art</a:t>
-            </a:r>
-            <a:endParaRPr lang="en-US" dirty="0"/>
+              <a:rPr lang="en-US" sz="4400" dirty="0" smtClean="0"/>
+              <a:t>Problem Formulation</a:t>
+            </a:r>
+            <a:endParaRPr lang="en-US" sz="4400" dirty="0"/>
           </a:p>
         </p:txBody>
       </p:sp>
     </p:spTree>
     <p:extLst>
       <p:ext uri="{BB962C8B-B14F-4D97-AF65-F5344CB8AC3E}">
-        <p14:creationId xmlns:p14="http://schemas.microsoft.com/office/powerpoint/2010/main" val="998345165"/>
+        <p14:creationId xmlns:p14="http://schemas.microsoft.com/office/powerpoint/2010/main" val="680174686"/>
       </p:ext>
     </p:extLst>
   </p:cSld>

</xml_diff>

<commit_message>
Thesis proposal completed. Review to be done.
</commit_message>
<xml_diff>
--- a/Presentation/thesis_proposal.pptx
+++ b/Presentation/thesis_proposal.pptx
@@ -5,10 +5,10 @@
     <p:sldMasterId id="2147483651" r:id="rId1"/>
   </p:sldMasterIdLst>
   <p:notesMasterIdLst>
-    <p:notesMasterId r:id="rId20"/>
+    <p:notesMasterId r:id="rId22"/>
   </p:notesMasterIdLst>
   <p:handoutMasterIdLst>
-    <p:handoutMasterId r:id="rId21"/>
+    <p:handoutMasterId r:id="rId23"/>
   </p:handoutMasterIdLst>
   <p:sldIdLst>
     <p:sldId id="256" r:id="rId2"/>
@@ -17,18 +17,20 @@
     <p:sldId id="274" r:id="rId5"/>
     <p:sldId id="272" r:id="rId6"/>
     <p:sldId id="273" r:id="rId7"/>
-    <p:sldId id="259" r:id="rId8"/>
-    <p:sldId id="260" r:id="rId9"/>
-    <p:sldId id="261" r:id="rId10"/>
-    <p:sldId id="262" r:id="rId11"/>
-    <p:sldId id="263" r:id="rId12"/>
-    <p:sldId id="264" r:id="rId13"/>
-    <p:sldId id="271" r:id="rId14"/>
-    <p:sldId id="265" r:id="rId15"/>
-    <p:sldId id="266" r:id="rId16"/>
-    <p:sldId id="267" r:id="rId17"/>
-    <p:sldId id="268" r:id="rId18"/>
-    <p:sldId id="269" r:id="rId19"/>
+    <p:sldId id="275" r:id="rId8"/>
+    <p:sldId id="276" r:id="rId9"/>
+    <p:sldId id="259" r:id="rId10"/>
+    <p:sldId id="260" r:id="rId11"/>
+    <p:sldId id="261" r:id="rId12"/>
+    <p:sldId id="262" r:id="rId13"/>
+    <p:sldId id="263" r:id="rId14"/>
+    <p:sldId id="264" r:id="rId15"/>
+    <p:sldId id="271" r:id="rId16"/>
+    <p:sldId id="265" r:id="rId17"/>
+    <p:sldId id="266" r:id="rId18"/>
+    <p:sldId id="267" r:id="rId19"/>
+    <p:sldId id="268" r:id="rId20"/>
+    <p:sldId id="269" r:id="rId21"/>
   </p:sldIdLst>
   <p:sldSz cx="9144000" cy="5143500" type="screen16x9"/>
   <p:notesSz cx="6858000" cy="9144000"/>
@@ -1063,7 +1065,7 @@
                 <a:cs typeface="Verdana" pitchFamily="34" charset="0"/>
               </a:rPr>
               <a:pPr/>
-              <a:t>11</a:t>
+              <a:t>13</a:t>
             </a:fld>
             <a:endParaRPr lang="nl-NL" sz="1000" dirty="0">
               <a:latin typeface="Verdana" pitchFamily="34" charset="0"/>
@@ -5061,7 +5063,7 @@
     </p:spTree>
     <p:extLst>
       <p:ext uri="{BB962C8B-B14F-4D97-AF65-F5344CB8AC3E}">
-        <p14:creationId xmlns:p14="http://schemas.microsoft.com/office/powerpoint/2010/main" val="640494621"/>
+        <p14:creationId xmlns:p14="http://schemas.microsoft.com/office/powerpoint/2010/main" val="160779116"/>
       </p:ext>
     </p:extLst>
   </p:cSld>
@@ -5098,19 +5100,14 @@
             <p:ph type="title"/>
           </p:nvPr>
         </p:nvSpPr>
-        <p:spPr>
-          <a:xfrm>
-            <a:off x="3131840" y="1995686"/>
-            <a:ext cx="5472608" cy="1080120"/>
-          </a:xfrm>
-        </p:spPr>
+        <p:spPr/>
         <p:txBody>
           <a:bodyPr/>
           <a:lstStyle/>
           <a:p>
             <a:r>
               <a:rPr lang="en-US" sz="4400" dirty="0" smtClean="0"/>
-              <a:t>Reinforcement Learning in WNs</a:t>
+              <a:t>Problem Formulation</a:t>
             </a:r>
             <a:endParaRPr lang="en-US" sz="4400" dirty="0"/>
           </a:p>
@@ -5119,7 +5116,7 @@
     </p:spTree>
     <p:extLst>
       <p:ext uri="{BB962C8B-B14F-4D97-AF65-F5344CB8AC3E}">
-        <p14:creationId xmlns:p14="http://schemas.microsoft.com/office/powerpoint/2010/main" val="1605056383"/>
+        <p14:creationId xmlns:p14="http://schemas.microsoft.com/office/powerpoint/2010/main" val="680174686"/>
       </p:ext>
     </p:extLst>
   </p:cSld>
@@ -5161,15 +5158,7 @@
           <a:bodyPr/>
           <a:lstStyle/>
           <a:p>
-            <a:r>
-              <a:rPr lang="en-US" dirty="0" smtClean="0"/>
-              <a:t>Many categorizations: learner (passive/active), environment (known/unknown), model (with/without states)</a:t>
-            </a:r>
-            <a:r>
-              <a:rPr lang="mr-IN" dirty="0" smtClean="0"/>
-              <a:t>…</a:t>
-            </a:r>
-            <a:endParaRPr lang="en-US" dirty="0"/>
+            <a:endParaRPr lang="en-US"/>
           </a:p>
         </p:txBody>
       </p:sp>
@@ -5212,588 +5201,6 @@
           <a:bodyPr/>
           <a:lstStyle/>
           <a:p>
-            <a:r>
-              <a:rPr lang="en-US" dirty="0" smtClean="0"/>
-              <a:t>RL in WNs </a:t>
-            </a:r>
-            <a:r>
-              <a:rPr lang="mr-IN" dirty="0" smtClean="0"/>
-              <a:t>–</a:t>
-            </a:r>
-            <a:r>
-              <a:rPr lang="en-US" dirty="0" smtClean="0"/>
-              <a:t> State-of-the-Art</a:t>
-            </a:r>
-            <a:endParaRPr lang="en-US" dirty="0"/>
-          </a:p>
-        </p:txBody>
-      </p:sp>
-      <p:sp>
-        <p:nvSpPr>
-          <p:cNvPr id="5" name="TextBox 4"/>
-          <p:cNvSpPr txBox="1"/>
-          <p:nvPr/>
-        </p:nvSpPr>
-        <p:spPr>
-          <a:xfrm>
-            <a:off x="237833" y="2015285"/>
-            <a:ext cx="1329210" cy="1754326"/>
-          </a:xfrm>
-          <a:prstGeom prst="rect">
-            <a:avLst/>
-          </a:prstGeom>
-          <a:noFill/>
-        </p:spPr>
-        <p:txBody>
-          <a:bodyPr wrap="none" rtlCol="0">
-            <a:spAutoFit/>
-          </a:bodyPr>
-          <a:lstStyle/>
-          <a:p>
-            <a:r>
-              <a:rPr lang="en-US" dirty="0" smtClean="0"/>
-              <a:t>Prediction</a:t>
-            </a:r>
-          </a:p>
-          <a:p>
-            <a:endParaRPr lang="en-US" dirty="0"/>
-          </a:p>
-          <a:p>
-            <a:endParaRPr lang="en-US" dirty="0" smtClean="0"/>
-          </a:p>
-          <a:p>
-            <a:endParaRPr lang="en-US" dirty="0" smtClean="0"/>
-          </a:p>
-          <a:p>
-            <a:endParaRPr lang="en-US" dirty="0"/>
-          </a:p>
-          <a:p>
-            <a:r>
-              <a:rPr lang="en-US" dirty="0" smtClean="0"/>
-              <a:t>Control</a:t>
-            </a:r>
-            <a:endParaRPr lang="en-US" dirty="0"/>
-          </a:p>
-        </p:txBody>
-      </p:sp>
-      <p:sp>
-        <p:nvSpPr>
-          <p:cNvPr id="6" name="TextBox 5"/>
-          <p:cNvSpPr txBox="1"/>
-          <p:nvPr/>
-        </p:nvSpPr>
-        <p:spPr>
-          <a:xfrm>
-            <a:off x="4336937" y="3238679"/>
-            <a:ext cx="2493285" cy="1169551"/>
-          </a:xfrm>
-          <a:prstGeom prst="rect">
-            <a:avLst/>
-          </a:prstGeom>
-          <a:noFill/>
-        </p:spPr>
-        <p:txBody>
-          <a:bodyPr wrap="square" rtlCol="0">
-            <a:spAutoFit/>
-          </a:bodyPr>
-          <a:lstStyle/>
-          <a:p>
-            <a:r>
-              <a:rPr lang="en-US" sz="1400" dirty="0" smtClean="0"/>
-              <a:t>* Direct methods (estimate </a:t>
-            </a:r>
-          </a:p>
-          <a:p>
-            <a:r>
-              <a:rPr lang="en-US" sz="1400" dirty="0" smtClean="0"/>
-              <a:t>the optimal action-values directly)</a:t>
-            </a:r>
-          </a:p>
-          <a:p>
-            <a:r>
-              <a:rPr lang="en-US" sz="1400" dirty="0" smtClean="0"/>
-              <a:t>* Actor- </a:t>
-            </a:r>
-            <a:r>
-              <a:rPr lang="en-US" sz="1400" dirty="0"/>
-              <a:t>critic </a:t>
-            </a:r>
-            <a:r>
-              <a:rPr lang="en-US" sz="1400" dirty="0" smtClean="0"/>
-              <a:t>methods</a:t>
-            </a:r>
-            <a:endParaRPr lang="en-US" dirty="0"/>
-          </a:p>
-        </p:txBody>
-      </p:sp>
-      <p:sp>
-        <p:nvSpPr>
-          <p:cNvPr id="7" name="Rectangle 6"/>
-          <p:cNvSpPr/>
-          <p:nvPr/>
-        </p:nvSpPr>
-        <p:spPr>
-          <a:xfrm>
-            <a:off x="6975352" y="3392566"/>
-            <a:ext cx="1991663" cy="830997"/>
-          </a:xfrm>
-          <a:prstGeom prst="rect">
-            <a:avLst/>
-          </a:prstGeom>
-        </p:spPr>
-        <p:txBody>
-          <a:bodyPr wrap="square">
-            <a:spAutoFit/>
-          </a:bodyPr>
-          <a:lstStyle/>
-          <a:p>
-            <a:r>
-              <a:rPr lang="en-US" sz="1600" dirty="0">
-                <a:latin typeface="CMR12" charset="0"/>
-              </a:rPr>
-              <a:t>based on direct policy improvement and policy gradient </a:t>
-            </a:r>
-            <a:endParaRPr lang="en-US" sz="1600" dirty="0"/>
-          </a:p>
-        </p:txBody>
-      </p:sp>
-      <p:sp>
-        <p:nvSpPr>
-          <p:cNvPr id="8" name="Rectangle 7"/>
-          <p:cNvSpPr/>
-          <p:nvPr/>
-        </p:nvSpPr>
-        <p:spPr>
-          <a:xfrm>
-            <a:off x="1614449" y="2854616"/>
-            <a:ext cx="7377127" cy="369332"/>
-          </a:xfrm>
-          <a:prstGeom prst="rect">
-            <a:avLst/>
-          </a:prstGeom>
-        </p:spPr>
-        <p:txBody>
-          <a:bodyPr wrap="square">
-            <a:spAutoFit/>
-          </a:bodyPr>
-          <a:lstStyle/>
-          <a:p>
-            <a:r>
-              <a:rPr lang="en-US" dirty="0" smtClean="0">
-                <a:latin typeface="CMR12" charset="0"/>
-              </a:rPr>
-              <a:t>+ optimizing </a:t>
-            </a:r>
-            <a:r>
-              <a:rPr lang="en-US" dirty="0">
-                <a:latin typeface="CMR12" charset="0"/>
-              </a:rPr>
-              <a:t>online </a:t>
-            </a:r>
-            <a:r>
-              <a:rPr lang="en-US" dirty="0" smtClean="0">
-                <a:latin typeface="CMR12" charset="0"/>
-              </a:rPr>
-              <a:t>performance </a:t>
-            </a:r>
-            <a:r>
-              <a:rPr lang="en-US" sz="1600" dirty="0" smtClean="0">
-                <a:latin typeface="CMR12" charset="0"/>
-              </a:rPr>
-              <a:t>(</a:t>
-            </a:r>
-            <a:r>
-              <a:rPr lang="en-US" sz="1600" dirty="0"/>
-              <a:t>bandit problems and </a:t>
-            </a:r>
-            <a:r>
-              <a:rPr lang="en-US" sz="1600" dirty="0" smtClean="0"/>
-              <a:t>MDPs</a:t>
-            </a:r>
-            <a:r>
-              <a:rPr lang="en-US" sz="1600" dirty="0" smtClean="0">
-                <a:latin typeface="CMR12" charset="0"/>
-              </a:rPr>
-              <a:t>) </a:t>
-            </a:r>
-            <a:endParaRPr lang="en-US" sz="1600" dirty="0"/>
-          </a:p>
-        </p:txBody>
-      </p:sp>
-      <p:sp>
-        <p:nvSpPr>
-          <p:cNvPr id="9" name="Rectangle 8"/>
-          <p:cNvSpPr/>
-          <p:nvPr/>
-        </p:nvSpPr>
-        <p:spPr>
-          <a:xfrm>
-            <a:off x="1631775" y="3207901"/>
-            <a:ext cx="2679188" cy="1200329"/>
-          </a:xfrm>
-          <a:prstGeom prst="rect">
-            <a:avLst/>
-          </a:prstGeom>
-        </p:spPr>
-        <p:txBody>
-          <a:bodyPr wrap="square">
-            <a:spAutoFit/>
-          </a:bodyPr>
-          <a:lstStyle/>
-          <a:p>
-            <a:r>
-              <a:rPr lang="en-US" dirty="0" smtClean="0">
-                <a:latin typeface="CMR12" charset="0"/>
-              </a:rPr>
-              <a:t>+ methods </a:t>
-            </a:r>
-            <a:r>
-              <a:rPr lang="en-US" dirty="0">
-                <a:latin typeface="CMR12" charset="0"/>
-              </a:rPr>
-              <a:t>that aim at developing methods that can be used in large-scale applications </a:t>
-            </a:r>
-            <a:endParaRPr lang="en-US" dirty="0"/>
-          </a:p>
-        </p:txBody>
-      </p:sp>
-      <p:sp>
-        <p:nvSpPr>
-          <p:cNvPr id="10" name="Left Brace 9"/>
-          <p:cNvSpPr/>
-          <p:nvPr/>
-        </p:nvSpPr>
-        <p:spPr>
-          <a:xfrm>
-            <a:off x="1317571" y="2897965"/>
-            <a:ext cx="254101" cy="1618001"/>
-          </a:xfrm>
-          <a:prstGeom prst="leftBrace">
-            <a:avLst/>
-          </a:prstGeom>
-        </p:spPr>
-        <p:style>
-          <a:lnRef idx="1">
-            <a:schemeClr val="accent1"/>
-          </a:lnRef>
-          <a:fillRef idx="0">
-            <a:schemeClr val="accent1"/>
-          </a:fillRef>
-          <a:effectRef idx="0">
-            <a:schemeClr val="accent1"/>
-          </a:effectRef>
-          <a:fontRef idx="minor">
-            <a:schemeClr val="tx1"/>
-          </a:fontRef>
-        </p:style>
-        <p:txBody>
-          <a:bodyPr rtlCol="0" anchor="ctr"/>
-          <a:lstStyle/>
-          <a:p>
-            <a:pPr algn="ctr"/>
-            <a:endParaRPr lang="en-US"/>
-          </a:p>
-        </p:txBody>
-      </p:sp>
-      <p:sp>
-        <p:nvSpPr>
-          <p:cNvPr id="11" name="Left Brace 10"/>
-          <p:cNvSpPr/>
-          <p:nvPr/>
-        </p:nvSpPr>
-        <p:spPr>
-          <a:xfrm>
-            <a:off x="4097835" y="3266418"/>
-            <a:ext cx="273231" cy="1156544"/>
-          </a:xfrm>
-          <a:prstGeom prst="leftBrace">
-            <a:avLst/>
-          </a:prstGeom>
-        </p:spPr>
-        <p:style>
-          <a:lnRef idx="1">
-            <a:schemeClr val="accent1"/>
-          </a:lnRef>
-          <a:fillRef idx="0">
-            <a:schemeClr val="accent1"/>
-          </a:fillRef>
-          <a:effectRef idx="0">
-            <a:schemeClr val="accent1"/>
-          </a:effectRef>
-          <a:fontRef idx="minor">
-            <a:schemeClr val="tx1"/>
-          </a:fontRef>
-        </p:style>
-        <p:txBody>
-          <a:bodyPr rtlCol="0" anchor="ctr"/>
-          <a:lstStyle/>
-          <a:p>
-            <a:pPr algn="ctr"/>
-            <a:endParaRPr lang="en-US"/>
-          </a:p>
-        </p:txBody>
-      </p:sp>
-      <p:sp>
-        <p:nvSpPr>
-          <p:cNvPr id="13" name="Left Brace 12"/>
-          <p:cNvSpPr/>
-          <p:nvPr/>
-        </p:nvSpPr>
-        <p:spPr>
-          <a:xfrm flipH="1">
-            <a:off x="6795239" y="3215406"/>
-            <a:ext cx="153025" cy="1228552"/>
-          </a:xfrm>
-          <a:prstGeom prst="leftBrace">
-            <a:avLst/>
-          </a:prstGeom>
-        </p:spPr>
-        <p:style>
-          <a:lnRef idx="1">
-            <a:schemeClr val="accent1"/>
-          </a:lnRef>
-          <a:fillRef idx="0">
-            <a:schemeClr val="accent1"/>
-          </a:fillRef>
-          <a:effectRef idx="0">
-            <a:schemeClr val="accent1"/>
-          </a:effectRef>
-          <a:fontRef idx="minor">
-            <a:schemeClr val="tx1"/>
-          </a:fontRef>
-        </p:style>
-        <p:txBody>
-          <a:bodyPr rtlCol="0" anchor="ctr"/>
-          <a:lstStyle/>
-          <a:p>
-            <a:pPr algn="ctr"/>
-            <a:endParaRPr lang="en-US"/>
-          </a:p>
-        </p:txBody>
-      </p:sp>
-      <p:sp>
-        <p:nvSpPr>
-          <p:cNvPr id="15" name="Rectangle 14"/>
-          <p:cNvSpPr/>
-          <p:nvPr/>
-        </p:nvSpPr>
-        <p:spPr>
-          <a:xfrm>
-            <a:off x="1567044" y="1830619"/>
-            <a:ext cx="2631326" cy="1200329"/>
-          </a:xfrm>
-          <a:prstGeom prst="rect">
-            <a:avLst/>
-          </a:prstGeom>
-        </p:spPr>
-        <p:txBody>
-          <a:bodyPr wrap="square">
-            <a:spAutoFit/>
-          </a:bodyPr>
-          <a:lstStyle/>
-          <a:p>
-            <a:r>
-              <a:rPr lang="en-US" dirty="0" smtClean="0">
-                <a:latin typeface="CMR12" charset="0"/>
-              </a:rPr>
-              <a:t>+ tabular (Monte-Carlo and TD(</a:t>
-            </a:r>
-            <a:r>
-              <a:rPr lang="en-US" dirty="0" err="1">
-                <a:latin typeface="CMR12" charset="0"/>
-              </a:rPr>
-              <a:t>λ</a:t>
-            </a:r>
-            <a:r>
-              <a:rPr lang="en-US" dirty="0" smtClean="0">
-                <a:latin typeface="CMR12" charset="0"/>
-              </a:rPr>
-              <a:t>))</a:t>
-            </a:r>
-            <a:endParaRPr lang="en-US" dirty="0">
-              <a:latin typeface="CMR12" charset="0"/>
-            </a:endParaRPr>
-          </a:p>
-          <a:p>
-            <a:r>
-              <a:rPr lang="en-US" dirty="0" smtClean="0">
-                <a:latin typeface="CMR12" charset="0"/>
-              </a:rPr>
-              <a:t>+ Function approximation (large </a:t>
-            </a:r>
-            <a:r>
-              <a:rPr lang="en-US" dirty="0">
-                <a:latin typeface="CMR12" charset="0"/>
-              </a:rPr>
-              <a:t>states </a:t>
-            </a:r>
-            <a:r>
-              <a:rPr lang="en-US" dirty="0" smtClean="0">
-                <a:latin typeface="CMR12" charset="0"/>
-              </a:rPr>
-              <a:t>space) </a:t>
-            </a:r>
-            <a:endParaRPr lang="en-US" dirty="0">
-              <a:latin typeface="CMR12" charset="0"/>
-            </a:endParaRPr>
-          </a:p>
-        </p:txBody>
-      </p:sp>
-      <p:sp>
-        <p:nvSpPr>
-          <p:cNvPr id="16" name="Rectangle 15"/>
-          <p:cNvSpPr/>
-          <p:nvPr/>
-        </p:nvSpPr>
-        <p:spPr>
-          <a:xfrm>
-            <a:off x="4225457" y="2135357"/>
-            <a:ext cx="4679486" cy="923330"/>
-          </a:xfrm>
-          <a:prstGeom prst="rect">
-            <a:avLst/>
-          </a:prstGeom>
-        </p:spPr>
-        <p:txBody>
-          <a:bodyPr wrap="none">
-            <a:spAutoFit/>
-          </a:bodyPr>
-          <a:lstStyle/>
-          <a:p>
-            <a:r>
-              <a:rPr lang="en-US" dirty="0" smtClean="0">
-                <a:latin typeface="CMR12" charset="0"/>
-              </a:rPr>
-              <a:t>* gradient </a:t>
-            </a:r>
-            <a:r>
-              <a:rPr lang="en-US" dirty="0">
-                <a:latin typeface="CMR12" charset="0"/>
-              </a:rPr>
-              <a:t>descend </a:t>
-            </a:r>
-            <a:r>
-              <a:rPr lang="en-US" dirty="0" smtClean="0">
-                <a:latin typeface="CMR12" charset="0"/>
-              </a:rPr>
-              <a:t>(GTD2 and TDC)</a:t>
-            </a:r>
-          </a:p>
-          <a:p>
-            <a:r>
-              <a:rPr lang="en-US" dirty="0" smtClean="0">
-                <a:latin typeface="CMR12" charset="0"/>
-              </a:rPr>
-              <a:t>* least-squares methods </a:t>
-            </a:r>
-            <a:r>
-              <a:rPr lang="en-US" dirty="0">
-                <a:latin typeface="CMR12" charset="0"/>
-              </a:rPr>
-              <a:t>(LSTD(</a:t>
-            </a:r>
-            <a:r>
-              <a:rPr lang="en-US" dirty="0" err="1">
-                <a:latin typeface="CMR12" charset="0"/>
-              </a:rPr>
-              <a:t>λ</a:t>
-            </a:r>
-            <a:r>
-              <a:rPr lang="en-US" dirty="0">
-                <a:latin typeface="CMR12" charset="0"/>
-              </a:rPr>
-              <a:t>) and </a:t>
-            </a:r>
-            <a:r>
-              <a:rPr lang="en-US" dirty="0" err="1">
-                <a:latin typeface="CMR12" charset="0"/>
-              </a:rPr>
-              <a:t>λ</a:t>
-            </a:r>
-            <a:r>
-              <a:rPr lang="en-US" dirty="0">
-                <a:latin typeface="CMR12" charset="0"/>
-              </a:rPr>
-              <a:t>-LSPE) </a:t>
-            </a:r>
-          </a:p>
-          <a:p>
-            <a:endParaRPr lang="en-US" dirty="0"/>
-          </a:p>
-        </p:txBody>
-      </p:sp>
-      <p:sp>
-        <p:nvSpPr>
-          <p:cNvPr id="17" name="Left Brace 16"/>
-          <p:cNvSpPr/>
-          <p:nvPr/>
-        </p:nvSpPr>
-        <p:spPr>
-          <a:xfrm>
-            <a:off x="4139952" y="2127045"/>
-            <a:ext cx="171011" cy="588721"/>
-          </a:xfrm>
-          <a:prstGeom prst="leftBrace">
-            <a:avLst/>
-          </a:prstGeom>
-        </p:spPr>
-        <p:style>
-          <a:lnRef idx="1">
-            <a:schemeClr val="accent1"/>
-          </a:lnRef>
-          <a:fillRef idx="0">
-            <a:schemeClr val="accent1"/>
-          </a:fillRef>
-          <a:effectRef idx="0">
-            <a:schemeClr val="accent1"/>
-          </a:effectRef>
-          <a:fontRef idx="minor">
-            <a:schemeClr val="tx1"/>
-          </a:fontRef>
-        </p:style>
-        <p:txBody>
-          <a:bodyPr rtlCol="0" anchor="ctr"/>
-          <a:lstStyle/>
-          <a:p>
-            <a:pPr algn="ctr"/>
-            <a:endParaRPr lang="en-US"/>
-          </a:p>
-        </p:txBody>
-      </p:sp>
-      <p:sp>
-        <p:nvSpPr>
-          <p:cNvPr id="18" name="Left Brace 17"/>
-          <p:cNvSpPr/>
-          <p:nvPr/>
-        </p:nvSpPr>
-        <p:spPr>
-          <a:xfrm>
-            <a:off x="1475656" y="1934318"/>
-            <a:ext cx="252458" cy="776282"/>
-          </a:xfrm>
-          <a:prstGeom prst="leftBrace">
-            <a:avLst/>
-          </a:prstGeom>
-        </p:spPr>
-        <p:style>
-          <a:lnRef idx="1">
-            <a:schemeClr val="accent1"/>
-          </a:lnRef>
-          <a:fillRef idx="0">
-            <a:schemeClr val="accent1"/>
-          </a:fillRef>
-          <a:effectRef idx="0">
-            <a:schemeClr val="accent1"/>
-          </a:effectRef>
-          <a:fontRef idx="minor">
-            <a:schemeClr val="tx1"/>
-          </a:fontRef>
-        </p:style>
-        <p:txBody>
-          <a:bodyPr rtlCol="0" anchor="ctr"/>
-          <a:lstStyle/>
-          <a:p>
-            <a:pPr algn="ctr"/>
             <a:endParaRPr lang="en-US"/>
           </a:p>
         </p:txBody>
@@ -5801,7 +5208,7 @@
     </p:spTree>
     <p:extLst>
       <p:ext uri="{BB962C8B-B14F-4D97-AF65-F5344CB8AC3E}">
-        <p14:creationId xmlns:p14="http://schemas.microsoft.com/office/powerpoint/2010/main" val="998345165"/>
+        <p14:creationId xmlns:p14="http://schemas.microsoft.com/office/powerpoint/2010/main" val="640494621"/>
       </p:ext>
     </p:extLst>
   </p:cSld>
@@ -5830,50 +5237,7 @@
       </p:grpSpPr>
       <p:sp>
         <p:nvSpPr>
-          <p:cNvPr id="2" name="Content Placeholder 1"/>
-          <p:cNvSpPr>
-            <a:spLocks noGrp="1"/>
-          </p:cNvSpPr>
-          <p:nvPr>
-            <p:ph idx="1"/>
-          </p:nvPr>
-        </p:nvSpPr>
-        <p:spPr/>
-        <p:txBody>
-          <a:bodyPr/>
-          <a:lstStyle/>
-          <a:p>
-            <a:endParaRPr lang="en-US"/>
-          </a:p>
-        </p:txBody>
-      </p:sp>
-      <p:sp>
-        <p:nvSpPr>
-          <p:cNvPr id="3" name="Slide Number Placeholder 2"/>
-          <p:cNvSpPr>
-            <a:spLocks noGrp="1"/>
-          </p:cNvSpPr>
-          <p:nvPr>
-            <p:ph type="sldNum" sz="quarter" idx="4"/>
-          </p:nvPr>
-        </p:nvSpPr>
-        <p:spPr/>
-        <p:txBody>
-          <a:bodyPr/>
-          <a:lstStyle/>
-          <a:p>
-            <a:fld id="{DAF489CC-3B7A-4DA5-A8C0-4984788D0EC5}" type="slidenum">
-              <a:rPr lang="nl-NL" smtClean="0"/>
-              <a:pPr/>
-              <a:t>13</a:t>
-            </a:fld>
-            <a:endParaRPr lang="nl-NL" dirty="0"/>
-          </a:p>
-        </p:txBody>
-      </p:sp>
-      <p:sp>
-        <p:nvSpPr>
-          <p:cNvPr id="4" name="Title 3"/>
+          <p:cNvPr id="2" name="Title 1"/>
           <p:cNvSpPr>
             <a:spLocks noGrp="1"/>
           </p:cNvSpPr>
@@ -5881,31 +5245,28 @@
             <p:ph type="title"/>
           </p:nvPr>
         </p:nvSpPr>
-        <p:spPr/>
+        <p:spPr>
+          <a:xfrm>
+            <a:off x="3131840" y="1995686"/>
+            <a:ext cx="5472608" cy="1080120"/>
+          </a:xfrm>
+        </p:spPr>
         <p:txBody>
           <a:bodyPr/>
           <a:lstStyle/>
           <a:p>
             <a:r>
-              <a:rPr lang="en-US" dirty="0" smtClean="0"/>
-              <a:t>RL in WNs </a:t>
-            </a:r>
-            <a:r>
-              <a:rPr lang="mr-IN" dirty="0" smtClean="0"/>
-              <a:t>–</a:t>
-            </a:r>
-            <a:r>
-              <a:rPr lang="en-US" dirty="0" smtClean="0"/>
-              <a:t> Feasibility &amp; Considerations</a:t>
-            </a:r>
-            <a:endParaRPr lang="en-US" dirty="0"/>
+              <a:rPr lang="en-US" sz="4400" dirty="0" smtClean="0"/>
+              <a:t>Reinforcement Learning in WNs</a:t>
+            </a:r>
+            <a:endParaRPr lang="en-US" sz="4400" dirty="0"/>
           </a:p>
         </p:txBody>
       </p:sp>
     </p:spTree>
     <p:extLst>
       <p:ext uri="{BB962C8B-B14F-4D97-AF65-F5344CB8AC3E}">
-        <p14:creationId xmlns:p14="http://schemas.microsoft.com/office/powerpoint/2010/main" val="681448446"/>
+        <p14:creationId xmlns:p14="http://schemas.microsoft.com/office/powerpoint/2010/main" val="1605056383"/>
       </p:ext>
     </p:extLst>
   </p:cSld>
@@ -5934,7 +5295,58 @@
       </p:grpSpPr>
       <p:sp>
         <p:nvSpPr>
-          <p:cNvPr id="2" name="Title 1"/>
+          <p:cNvPr id="2" name="Content Placeholder 1"/>
+          <p:cNvSpPr>
+            <a:spLocks noGrp="1"/>
+          </p:cNvSpPr>
+          <p:nvPr>
+            <p:ph idx="1"/>
+          </p:nvPr>
+        </p:nvSpPr>
+        <p:spPr/>
+        <p:txBody>
+          <a:bodyPr/>
+          <a:lstStyle/>
+          <a:p>
+            <a:r>
+              <a:rPr lang="en-US" dirty="0" smtClean="0"/>
+              <a:t>Many categorizations: learner (passive/active), environment (known/unknown), model (with/without states)</a:t>
+            </a:r>
+            <a:r>
+              <a:rPr lang="mr-IN" dirty="0" smtClean="0"/>
+              <a:t>…</a:t>
+            </a:r>
+            <a:endParaRPr lang="en-US" dirty="0"/>
+          </a:p>
+        </p:txBody>
+      </p:sp>
+      <p:sp>
+        <p:nvSpPr>
+          <p:cNvPr id="3" name="Slide Number Placeholder 2"/>
+          <p:cNvSpPr>
+            <a:spLocks noGrp="1"/>
+          </p:cNvSpPr>
+          <p:nvPr>
+            <p:ph type="sldNum" sz="quarter" idx="4"/>
+          </p:nvPr>
+        </p:nvSpPr>
+        <p:spPr/>
+        <p:txBody>
+          <a:bodyPr/>
+          <a:lstStyle/>
+          <a:p>
+            <a:fld id="{DAF489CC-3B7A-4DA5-A8C0-4984788D0EC5}" type="slidenum">
+              <a:rPr lang="nl-NL" smtClean="0"/>
+              <a:pPr/>
+              <a:t>14</a:t>
+            </a:fld>
+            <a:endParaRPr lang="nl-NL" dirty="0"/>
+          </a:p>
+        </p:txBody>
+      </p:sp>
+      <p:sp>
+        <p:nvSpPr>
+          <p:cNvPr id="4" name="Title 3"/>
           <p:cNvSpPr>
             <a:spLocks noGrp="1"/>
           </p:cNvSpPr>
@@ -5948,17 +5360,595 @@
           <a:lstStyle/>
           <a:p>
             <a:r>
-              <a:rPr lang="en-US" sz="4400" dirty="0" smtClean="0"/>
-              <a:t>Current Contributions &amp; Ongoing Work</a:t>
-            </a:r>
-            <a:endParaRPr lang="en-US" sz="4400" dirty="0"/>
+              <a:rPr lang="en-US" dirty="0" smtClean="0"/>
+              <a:t>RL in WNs </a:t>
+            </a:r>
+            <a:r>
+              <a:rPr lang="mr-IN" dirty="0" smtClean="0"/>
+              <a:t>–</a:t>
+            </a:r>
+            <a:r>
+              <a:rPr lang="en-US" dirty="0" smtClean="0"/>
+              <a:t> State-of-the-Art</a:t>
+            </a:r>
+            <a:endParaRPr lang="en-US" dirty="0"/>
+          </a:p>
+        </p:txBody>
+      </p:sp>
+      <p:sp>
+        <p:nvSpPr>
+          <p:cNvPr id="5" name="TextBox 4"/>
+          <p:cNvSpPr txBox="1"/>
+          <p:nvPr/>
+        </p:nvSpPr>
+        <p:spPr>
+          <a:xfrm>
+            <a:off x="237833" y="2015285"/>
+            <a:ext cx="1329210" cy="1754326"/>
+          </a:xfrm>
+          <a:prstGeom prst="rect">
+            <a:avLst/>
+          </a:prstGeom>
+          <a:noFill/>
+        </p:spPr>
+        <p:txBody>
+          <a:bodyPr wrap="none" rtlCol="0">
+            <a:spAutoFit/>
+          </a:bodyPr>
+          <a:lstStyle/>
+          <a:p>
+            <a:r>
+              <a:rPr lang="en-US" dirty="0" smtClean="0"/>
+              <a:t>Prediction</a:t>
+            </a:r>
+          </a:p>
+          <a:p>
+            <a:endParaRPr lang="en-US" dirty="0"/>
+          </a:p>
+          <a:p>
+            <a:endParaRPr lang="en-US" dirty="0" smtClean="0"/>
+          </a:p>
+          <a:p>
+            <a:endParaRPr lang="en-US" dirty="0" smtClean="0"/>
+          </a:p>
+          <a:p>
+            <a:endParaRPr lang="en-US" dirty="0"/>
+          </a:p>
+          <a:p>
+            <a:r>
+              <a:rPr lang="en-US" dirty="0" smtClean="0"/>
+              <a:t>Control</a:t>
+            </a:r>
+            <a:endParaRPr lang="en-US" dirty="0"/>
+          </a:p>
+        </p:txBody>
+      </p:sp>
+      <p:sp>
+        <p:nvSpPr>
+          <p:cNvPr id="6" name="TextBox 5"/>
+          <p:cNvSpPr txBox="1"/>
+          <p:nvPr/>
+        </p:nvSpPr>
+        <p:spPr>
+          <a:xfrm>
+            <a:off x="4336937" y="3238679"/>
+            <a:ext cx="2493285" cy="1169551"/>
+          </a:xfrm>
+          <a:prstGeom prst="rect">
+            <a:avLst/>
+          </a:prstGeom>
+          <a:noFill/>
+        </p:spPr>
+        <p:txBody>
+          <a:bodyPr wrap="square" rtlCol="0">
+            <a:spAutoFit/>
+          </a:bodyPr>
+          <a:lstStyle/>
+          <a:p>
+            <a:r>
+              <a:rPr lang="en-US" sz="1400" dirty="0" smtClean="0"/>
+              <a:t>* Direct methods (estimate </a:t>
+            </a:r>
+          </a:p>
+          <a:p>
+            <a:r>
+              <a:rPr lang="en-US" sz="1400" dirty="0" smtClean="0"/>
+              <a:t>the optimal action-values directly)</a:t>
+            </a:r>
+          </a:p>
+          <a:p>
+            <a:r>
+              <a:rPr lang="en-US" sz="1400" dirty="0" smtClean="0"/>
+              <a:t>* Actor- </a:t>
+            </a:r>
+            <a:r>
+              <a:rPr lang="en-US" sz="1400" dirty="0"/>
+              <a:t>critic </a:t>
+            </a:r>
+            <a:r>
+              <a:rPr lang="en-US" sz="1400" dirty="0" smtClean="0"/>
+              <a:t>methods</a:t>
+            </a:r>
+            <a:endParaRPr lang="en-US" dirty="0"/>
+          </a:p>
+        </p:txBody>
+      </p:sp>
+      <p:sp>
+        <p:nvSpPr>
+          <p:cNvPr id="7" name="Rectangle 6"/>
+          <p:cNvSpPr/>
+          <p:nvPr/>
+        </p:nvSpPr>
+        <p:spPr>
+          <a:xfrm>
+            <a:off x="6975352" y="3392566"/>
+            <a:ext cx="1991663" cy="830997"/>
+          </a:xfrm>
+          <a:prstGeom prst="rect">
+            <a:avLst/>
+          </a:prstGeom>
+        </p:spPr>
+        <p:txBody>
+          <a:bodyPr wrap="square">
+            <a:spAutoFit/>
+          </a:bodyPr>
+          <a:lstStyle/>
+          <a:p>
+            <a:r>
+              <a:rPr lang="en-US" sz="1600" dirty="0">
+                <a:latin typeface="CMR12" charset="0"/>
+              </a:rPr>
+              <a:t>based on direct policy improvement and policy gradient </a:t>
+            </a:r>
+            <a:endParaRPr lang="en-US" sz="1600" dirty="0"/>
+          </a:p>
+        </p:txBody>
+      </p:sp>
+      <p:sp>
+        <p:nvSpPr>
+          <p:cNvPr id="8" name="Rectangle 7"/>
+          <p:cNvSpPr/>
+          <p:nvPr/>
+        </p:nvSpPr>
+        <p:spPr>
+          <a:xfrm>
+            <a:off x="1614449" y="2854616"/>
+            <a:ext cx="7377127" cy="369332"/>
+          </a:xfrm>
+          <a:prstGeom prst="rect">
+            <a:avLst/>
+          </a:prstGeom>
+        </p:spPr>
+        <p:txBody>
+          <a:bodyPr wrap="square">
+            <a:spAutoFit/>
+          </a:bodyPr>
+          <a:lstStyle/>
+          <a:p>
+            <a:r>
+              <a:rPr lang="en-US" dirty="0" smtClean="0">
+                <a:latin typeface="CMR12" charset="0"/>
+              </a:rPr>
+              <a:t>+ optimizing </a:t>
+            </a:r>
+            <a:r>
+              <a:rPr lang="en-US" dirty="0">
+                <a:latin typeface="CMR12" charset="0"/>
+              </a:rPr>
+              <a:t>online </a:t>
+            </a:r>
+            <a:r>
+              <a:rPr lang="en-US" dirty="0" smtClean="0">
+                <a:latin typeface="CMR12" charset="0"/>
+              </a:rPr>
+              <a:t>performance </a:t>
+            </a:r>
+            <a:r>
+              <a:rPr lang="en-US" sz="1600" dirty="0" smtClean="0">
+                <a:latin typeface="CMR12" charset="0"/>
+              </a:rPr>
+              <a:t>(</a:t>
+            </a:r>
+            <a:r>
+              <a:rPr lang="en-US" sz="1600" dirty="0"/>
+              <a:t>bandit problems and </a:t>
+            </a:r>
+            <a:r>
+              <a:rPr lang="en-US" sz="1600" dirty="0" smtClean="0"/>
+              <a:t>MDPs</a:t>
+            </a:r>
+            <a:r>
+              <a:rPr lang="en-US" sz="1600" dirty="0" smtClean="0">
+                <a:latin typeface="CMR12" charset="0"/>
+              </a:rPr>
+              <a:t>) </a:t>
+            </a:r>
+            <a:endParaRPr lang="en-US" sz="1600" dirty="0"/>
+          </a:p>
+        </p:txBody>
+      </p:sp>
+      <p:sp>
+        <p:nvSpPr>
+          <p:cNvPr id="9" name="Rectangle 8"/>
+          <p:cNvSpPr/>
+          <p:nvPr/>
+        </p:nvSpPr>
+        <p:spPr>
+          <a:xfrm>
+            <a:off x="1631775" y="3207901"/>
+            <a:ext cx="2679188" cy="1200329"/>
+          </a:xfrm>
+          <a:prstGeom prst="rect">
+            <a:avLst/>
+          </a:prstGeom>
+        </p:spPr>
+        <p:txBody>
+          <a:bodyPr wrap="square">
+            <a:spAutoFit/>
+          </a:bodyPr>
+          <a:lstStyle/>
+          <a:p>
+            <a:r>
+              <a:rPr lang="en-US" dirty="0" smtClean="0">
+                <a:latin typeface="CMR12" charset="0"/>
+              </a:rPr>
+              <a:t>+ methods </a:t>
+            </a:r>
+            <a:r>
+              <a:rPr lang="en-US" dirty="0">
+                <a:latin typeface="CMR12" charset="0"/>
+              </a:rPr>
+              <a:t>that aim at developing methods that can be used in large-scale applications </a:t>
+            </a:r>
+            <a:endParaRPr lang="en-US" dirty="0"/>
+          </a:p>
+        </p:txBody>
+      </p:sp>
+      <p:sp>
+        <p:nvSpPr>
+          <p:cNvPr id="10" name="Left Brace 9"/>
+          <p:cNvSpPr/>
+          <p:nvPr/>
+        </p:nvSpPr>
+        <p:spPr>
+          <a:xfrm>
+            <a:off x="1317571" y="2897965"/>
+            <a:ext cx="254101" cy="1618001"/>
+          </a:xfrm>
+          <a:prstGeom prst="leftBrace">
+            <a:avLst/>
+          </a:prstGeom>
+        </p:spPr>
+        <p:style>
+          <a:lnRef idx="1">
+            <a:schemeClr val="accent1"/>
+          </a:lnRef>
+          <a:fillRef idx="0">
+            <a:schemeClr val="accent1"/>
+          </a:fillRef>
+          <a:effectRef idx="0">
+            <a:schemeClr val="accent1"/>
+          </a:effectRef>
+          <a:fontRef idx="minor">
+            <a:schemeClr val="tx1"/>
+          </a:fontRef>
+        </p:style>
+        <p:txBody>
+          <a:bodyPr rtlCol="0" anchor="ctr"/>
+          <a:lstStyle/>
+          <a:p>
+            <a:pPr algn="ctr"/>
+            <a:endParaRPr lang="en-US"/>
+          </a:p>
+        </p:txBody>
+      </p:sp>
+      <p:sp>
+        <p:nvSpPr>
+          <p:cNvPr id="11" name="Left Brace 10"/>
+          <p:cNvSpPr/>
+          <p:nvPr/>
+        </p:nvSpPr>
+        <p:spPr>
+          <a:xfrm>
+            <a:off x="4097835" y="3266418"/>
+            <a:ext cx="273231" cy="1156544"/>
+          </a:xfrm>
+          <a:prstGeom prst="leftBrace">
+            <a:avLst/>
+          </a:prstGeom>
+        </p:spPr>
+        <p:style>
+          <a:lnRef idx="1">
+            <a:schemeClr val="accent1"/>
+          </a:lnRef>
+          <a:fillRef idx="0">
+            <a:schemeClr val="accent1"/>
+          </a:fillRef>
+          <a:effectRef idx="0">
+            <a:schemeClr val="accent1"/>
+          </a:effectRef>
+          <a:fontRef idx="minor">
+            <a:schemeClr val="tx1"/>
+          </a:fontRef>
+        </p:style>
+        <p:txBody>
+          <a:bodyPr rtlCol="0" anchor="ctr"/>
+          <a:lstStyle/>
+          <a:p>
+            <a:pPr algn="ctr"/>
+            <a:endParaRPr lang="en-US"/>
+          </a:p>
+        </p:txBody>
+      </p:sp>
+      <p:sp>
+        <p:nvSpPr>
+          <p:cNvPr id="13" name="Left Brace 12"/>
+          <p:cNvSpPr/>
+          <p:nvPr/>
+        </p:nvSpPr>
+        <p:spPr>
+          <a:xfrm flipH="1">
+            <a:off x="6795239" y="3215406"/>
+            <a:ext cx="153025" cy="1228552"/>
+          </a:xfrm>
+          <a:prstGeom prst="leftBrace">
+            <a:avLst/>
+          </a:prstGeom>
+        </p:spPr>
+        <p:style>
+          <a:lnRef idx="1">
+            <a:schemeClr val="accent1"/>
+          </a:lnRef>
+          <a:fillRef idx="0">
+            <a:schemeClr val="accent1"/>
+          </a:fillRef>
+          <a:effectRef idx="0">
+            <a:schemeClr val="accent1"/>
+          </a:effectRef>
+          <a:fontRef idx="minor">
+            <a:schemeClr val="tx1"/>
+          </a:fontRef>
+        </p:style>
+        <p:txBody>
+          <a:bodyPr rtlCol="0" anchor="ctr"/>
+          <a:lstStyle/>
+          <a:p>
+            <a:pPr algn="ctr"/>
+            <a:endParaRPr lang="en-US"/>
+          </a:p>
+        </p:txBody>
+      </p:sp>
+      <p:sp>
+        <p:nvSpPr>
+          <p:cNvPr id="15" name="Rectangle 14"/>
+          <p:cNvSpPr/>
+          <p:nvPr/>
+        </p:nvSpPr>
+        <p:spPr>
+          <a:xfrm>
+            <a:off x="1567044" y="1830619"/>
+            <a:ext cx="2631326" cy="1200329"/>
+          </a:xfrm>
+          <a:prstGeom prst="rect">
+            <a:avLst/>
+          </a:prstGeom>
+        </p:spPr>
+        <p:txBody>
+          <a:bodyPr wrap="square">
+            <a:spAutoFit/>
+          </a:bodyPr>
+          <a:lstStyle/>
+          <a:p>
+            <a:r>
+              <a:rPr lang="en-US" dirty="0" smtClean="0">
+                <a:latin typeface="CMR12" charset="0"/>
+              </a:rPr>
+              <a:t>+ tabular (Monte-Carlo and TD(</a:t>
+            </a:r>
+            <a:r>
+              <a:rPr lang="en-US" dirty="0" err="1">
+                <a:latin typeface="CMR12" charset="0"/>
+              </a:rPr>
+              <a:t>λ</a:t>
+            </a:r>
+            <a:r>
+              <a:rPr lang="en-US" dirty="0" smtClean="0">
+                <a:latin typeface="CMR12" charset="0"/>
+              </a:rPr>
+              <a:t>))</a:t>
+            </a:r>
+            <a:endParaRPr lang="en-US" dirty="0">
+              <a:latin typeface="CMR12" charset="0"/>
+            </a:endParaRPr>
+          </a:p>
+          <a:p>
+            <a:r>
+              <a:rPr lang="en-US" dirty="0" smtClean="0">
+                <a:latin typeface="CMR12" charset="0"/>
+              </a:rPr>
+              <a:t>+ Function approximation (large </a:t>
+            </a:r>
+            <a:r>
+              <a:rPr lang="en-US" dirty="0">
+                <a:latin typeface="CMR12" charset="0"/>
+              </a:rPr>
+              <a:t>states </a:t>
+            </a:r>
+            <a:r>
+              <a:rPr lang="en-US" dirty="0" smtClean="0">
+                <a:latin typeface="CMR12" charset="0"/>
+              </a:rPr>
+              <a:t>space) </a:t>
+            </a:r>
+            <a:endParaRPr lang="en-US" dirty="0">
+              <a:latin typeface="CMR12" charset="0"/>
+            </a:endParaRPr>
+          </a:p>
+        </p:txBody>
+      </p:sp>
+      <p:sp>
+        <p:nvSpPr>
+          <p:cNvPr id="16" name="Rectangle 15"/>
+          <p:cNvSpPr/>
+          <p:nvPr/>
+        </p:nvSpPr>
+        <p:spPr>
+          <a:xfrm>
+            <a:off x="4225457" y="2135357"/>
+            <a:ext cx="4679486" cy="923330"/>
+          </a:xfrm>
+          <a:prstGeom prst="rect">
+            <a:avLst/>
+          </a:prstGeom>
+        </p:spPr>
+        <p:txBody>
+          <a:bodyPr wrap="none">
+            <a:spAutoFit/>
+          </a:bodyPr>
+          <a:lstStyle/>
+          <a:p>
+            <a:r>
+              <a:rPr lang="en-US" dirty="0" smtClean="0">
+                <a:latin typeface="CMR12" charset="0"/>
+              </a:rPr>
+              <a:t>* gradient </a:t>
+            </a:r>
+            <a:r>
+              <a:rPr lang="en-US" dirty="0">
+                <a:latin typeface="CMR12" charset="0"/>
+              </a:rPr>
+              <a:t>descend </a:t>
+            </a:r>
+            <a:r>
+              <a:rPr lang="en-US" dirty="0" smtClean="0">
+                <a:latin typeface="CMR12" charset="0"/>
+              </a:rPr>
+              <a:t>(GTD2 and TDC)</a:t>
+            </a:r>
+          </a:p>
+          <a:p>
+            <a:r>
+              <a:rPr lang="en-US" dirty="0" smtClean="0">
+                <a:latin typeface="CMR12" charset="0"/>
+              </a:rPr>
+              <a:t>* least-squares methods </a:t>
+            </a:r>
+            <a:r>
+              <a:rPr lang="en-US" dirty="0">
+                <a:latin typeface="CMR12" charset="0"/>
+              </a:rPr>
+              <a:t>(LSTD(</a:t>
+            </a:r>
+            <a:r>
+              <a:rPr lang="en-US" dirty="0" err="1">
+                <a:latin typeface="CMR12" charset="0"/>
+              </a:rPr>
+              <a:t>λ</a:t>
+            </a:r>
+            <a:r>
+              <a:rPr lang="en-US" dirty="0">
+                <a:latin typeface="CMR12" charset="0"/>
+              </a:rPr>
+              <a:t>) and </a:t>
+            </a:r>
+            <a:r>
+              <a:rPr lang="en-US" dirty="0" err="1">
+                <a:latin typeface="CMR12" charset="0"/>
+              </a:rPr>
+              <a:t>λ</a:t>
+            </a:r>
+            <a:r>
+              <a:rPr lang="en-US" dirty="0">
+                <a:latin typeface="CMR12" charset="0"/>
+              </a:rPr>
+              <a:t>-LSPE) </a:t>
+            </a:r>
+          </a:p>
+          <a:p>
+            <a:endParaRPr lang="en-US" dirty="0"/>
+          </a:p>
+        </p:txBody>
+      </p:sp>
+      <p:sp>
+        <p:nvSpPr>
+          <p:cNvPr id="17" name="Left Brace 16"/>
+          <p:cNvSpPr/>
+          <p:nvPr/>
+        </p:nvSpPr>
+        <p:spPr>
+          <a:xfrm>
+            <a:off x="4139952" y="2127045"/>
+            <a:ext cx="171011" cy="588721"/>
+          </a:xfrm>
+          <a:prstGeom prst="leftBrace">
+            <a:avLst/>
+          </a:prstGeom>
+        </p:spPr>
+        <p:style>
+          <a:lnRef idx="1">
+            <a:schemeClr val="accent1"/>
+          </a:lnRef>
+          <a:fillRef idx="0">
+            <a:schemeClr val="accent1"/>
+          </a:fillRef>
+          <a:effectRef idx="0">
+            <a:schemeClr val="accent1"/>
+          </a:effectRef>
+          <a:fontRef idx="minor">
+            <a:schemeClr val="tx1"/>
+          </a:fontRef>
+        </p:style>
+        <p:txBody>
+          <a:bodyPr rtlCol="0" anchor="ctr"/>
+          <a:lstStyle/>
+          <a:p>
+            <a:pPr algn="ctr"/>
+            <a:endParaRPr lang="en-US"/>
+          </a:p>
+        </p:txBody>
+      </p:sp>
+      <p:sp>
+        <p:nvSpPr>
+          <p:cNvPr id="18" name="Left Brace 17"/>
+          <p:cNvSpPr/>
+          <p:nvPr/>
+        </p:nvSpPr>
+        <p:spPr>
+          <a:xfrm>
+            <a:off x="1475656" y="1934318"/>
+            <a:ext cx="252458" cy="776282"/>
+          </a:xfrm>
+          <a:prstGeom prst="leftBrace">
+            <a:avLst/>
+          </a:prstGeom>
+        </p:spPr>
+        <p:style>
+          <a:lnRef idx="1">
+            <a:schemeClr val="accent1"/>
+          </a:lnRef>
+          <a:fillRef idx="0">
+            <a:schemeClr val="accent1"/>
+          </a:fillRef>
+          <a:effectRef idx="0">
+            <a:schemeClr val="accent1"/>
+          </a:effectRef>
+          <a:fontRef idx="minor">
+            <a:schemeClr val="tx1"/>
+          </a:fontRef>
+        </p:style>
+        <p:txBody>
+          <a:bodyPr rtlCol="0" anchor="ctr"/>
+          <a:lstStyle/>
+          <a:p>
+            <a:pPr algn="ctr"/>
+            <a:endParaRPr lang="en-US"/>
           </a:p>
         </p:txBody>
       </p:sp>
     </p:spTree>
     <p:extLst>
       <p:ext uri="{BB962C8B-B14F-4D97-AF65-F5344CB8AC3E}">
-        <p14:creationId xmlns:p14="http://schemas.microsoft.com/office/powerpoint/2010/main" val="897454144"/>
+        <p14:creationId xmlns:p14="http://schemas.microsoft.com/office/powerpoint/2010/main" val="998345165"/>
       </p:ext>
     </p:extLst>
   </p:cSld>
@@ -6043,14 +6033,26 @@
           <a:bodyPr/>
           <a:lstStyle/>
           <a:p>
-            <a:endParaRPr lang="en-US"/>
+            <a:r>
+              <a:rPr lang="en-US" dirty="0" smtClean="0"/>
+              <a:t>RL in WNs </a:t>
+            </a:r>
+            <a:r>
+              <a:rPr lang="mr-IN" dirty="0" smtClean="0"/>
+              <a:t>–</a:t>
+            </a:r>
+            <a:r>
+              <a:rPr lang="en-US" dirty="0" smtClean="0"/>
+              <a:t> Feasibility &amp; Considerations</a:t>
+            </a:r>
+            <a:endParaRPr lang="en-US" dirty="0"/>
           </a:p>
         </p:txBody>
       </p:sp>
     </p:spTree>
     <p:extLst>
       <p:ext uri="{BB962C8B-B14F-4D97-AF65-F5344CB8AC3E}">
-        <p14:creationId xmlns:p14="http://schemas.microsoft.com/office/powerpoint/2010/main" val="1734145327"/>
+        <p14:creationId xmlns:p14="http://schemas.microsoft.com/office/powerpoint/2010/main" val="681448446"/>
       </p:ext>
     </p:extLst>
   </p:cSld>
@@ -6094,7 +6096,7 @@
           <a:p>
             <a:r>
               <a:rPr lang="en-US" sz="4400" dirty="0" smtClean="0"/>
-              <a:t>Future Work</a:t>
+              <a:t>Current Contributions &amp; Ongoing Work</a:t>
             </a:r>
             <a:endParaRPr lang="en-US" sz="4400" dirty="0"/>
           </a:p>
@@ -6103,7 +6105,7 @@
     </p:spTree>
     <p:extLst>
       <p:ext uri="{BB962C8B-B14F-4D97-AF65-F5344CB8AC3E}">
-        <p14:creationId xmlns:p14="http://schemas.microsoft.com/office/powerpoint/2010/main" val="132453805"/>
+        <p14:creationId xmlns:p14="http://schemas.microsoft.com/office/powerpoint/2010/main" val="897454144"/>
       </p:ext>
     </p:extLst>
   </p:cSld>
@@ -6195,7 +6197,7 @@
     </p:spTree>
     <p:extLst>
       <p:ext uri="{BB962C8B-B14F-4D97-AF65-F5344CB8AC3E}">
-        <p14:creationId xmlns:p14="http://schemas.microsoft.com/office/powerpoint/2010/main" val="1358042343"/>
+        <p14:creationId xmlns:p14="http://schemas.microsoft.com/office/powerpoint/2010/main" val="1734145327"/>
       </p:ext>
     </p:extLst>
   </p:cSld>
@@ -6229,31 +6231,118 @@
             <a:spLocks noGrp="1"/>
           </p:cNvSpPr>
           <p:nvPr>
-            <p:ph type="ctrTitle"/>
+            <p:ph type="title"/>
           </p:nvPr>
         </p:nvSpPr>
-        <p:spPr>
-          <a:xfrm>
-            <a:off x="215778" y="1203598"/>
-            <a:ext cx="8460678" cy="1102519"/>
-          </a:xfrm>
-        </p:spPr>
+        <p:spPr/>
         <p:txBody>
           <a:bodyPr/>
           <a:lstStyle/>
           <a:p>
             <a:r>
-              <a:rPr lang="en-US"/>
-              <a:t>Reinforcement Learning to Enhance Spatial Reuse in Dense Wireless Networks</a:t>
-            </a:r>
-            <a:endParaRPr lang="en-US" dirty="0"/>
+              <a:rPr lang="en-US" sz="4400" dirty="0" smtClean="0"/>
+              <a:t>Future Work</a:t>
+            </a:r>
+            <a:endParaRPr lang="en-US" sz="4400" dirty="0"/>
           </a:p>
         </p:txBody>
       </p:sp>
     </p:spTree>
     <p:extLst>
       <p:ext uri="{BB962C8B-B14F-4D97-AF65-F5344CB8AC3E}">
-        <p14:creationId xmlns:p14="http://schemas.microsoft.com/office/powerpoint/2010/main" val="1161458485"/>
+        <p14:creationId xmlns:p14="http://schemas.microsoft.com/office/powerpoint/2010/main" val="132453805"/>
+      </p:ext>
+    </p:extLst>
+  </p:cSld>
+  <p:clrMapOvr>
+    <a:masterClrMapping/>
+  </p:clrMapOvr>
+</p:sld>
+</file>
+
+<file path=ppt/slides/slide19.xml><?xml version="1.0" encoding="utf-8"?>
+<p:sld xmlns:a="http://schemas.openxmlformats.org/drawingml/2006/main" xmlns:r="http://schemas.openxmlformats.org/officeDocument/2006/relationships" xmlns:p="http://schemas.openxmlformats.org/presentationml/2006/main">
+  <p:cSld>
+    <p:spTree>
+      <p:nvGrpSpPr>
+        <p:cNvPr id="1" name=""/>
+        <p:cNvGrpSpPr/>
+        <p:nvPr/>
+      </p:nvGrpSpPr>
+      <p:grpSpPr>
+        <a:xfrm>
+          <a:off x="0" y="0"/>
+          <a:ext cx="0" cy="0"/>
+          <a:chOff x="0" y="0"/>
+          <a:chExt cx="0" cy="0"/>
+        </a:xfrm>
+      </p:grpSpPr>
+      <p:sp>
+        <p:nvSpPr>
+          <p:cNvPr id="2" name="Content Placeholder 1"/>
+          <p:cNvSpPr>
+            <a:spLocks noGrp="1"/>
+          </p:cNvSpPr>
+          <p:nvPr>
+            <p:ph idx="1"/>
+          </p:nvPr>
+        </p:nvSpPr>
+        <p:spPr/>
+        <p:txBody>
+          <a:bodyPr/>
+          <a:lstStyle/>
+          <a:p>
+            <a:endParaRPr lang="en-US"/>
+          </a:p>
+        </p:txBody>
+      </p:sp>
+      <p:sp>
+        <p:nvSpPr>
+          <p:cNvPr id="3" name="Slide Number Placeholder 2"/>
+          <p:cNvSpPr>
+            <a:spLocks noGrp="1"/>
+          </p:cNvSpPr>
+          <p:nvPr>
+            <p:ph type="sldNum" sz="quarter" idx="4"/>
+          </p:nvPr>
+        </p:nvSpPr>
+        <p:spPr/>
+        <p:txBody>
+          <a:bodyPr/>
+          <a:lstStyle/>
+          <a:p>
+            <a:fld id="{DAF489CC-3B7A-4DA5-A8C0-4984788D0EC5}" type="slidenum">
+              <a:rPr lang="nl-NL" smtClean="0"/>
+              <a:pPr/>
+              <a:t>19</a:t>
+            </a:fld>
+            <a:endParaRPr lang="nl-NL" dirty="0"/>
+          </a:p>
+        </p:txBody>
+      </p:sp>
+      <p:sp>
+        <p:nvSpPr>
+          <p:cNvPr id="4" name="Title 3"/>
+          <p:cNvSpPr>
+            <a:spLocks noGrp="1"/>
+          </p:cNvSpPr>
+          <p:nvPr>
+            <p:ph type="title"/>
+          </p:nvPr>
+        </p:nvSpPr>
+        <p:spPr/>
+        <p:txBody>
+          <a:bodyPr/>
+          <a:lstStyle/>
+          <a:p>
+            <a:endParaRPr lang="en-US"/>
+          </a:p>
+        </p:txBody>
+      </p:sp>
+    </p:spTree>
+    <p:extLst>
+      <p:ext uri="{BB962C8B-B14F-4D97-AF65-F5344CB8AC3E}">
+        <p14:creationId xmlns:p14="http://schemas.microsoft.com/office/powerpoint/2010/main" val="1358042343"/>
       </p:ext>
     </p:extLst>
   </p:cSld>
@@ -6320,6 +6409,64 @@
       </p:par>
     </p:tnLst>
   </p:timing>
+</p:sld>
+</file>
+
+<file path=ppt/slides/slide20.xml><?xml version="1.0" encoding="utf-8"?>
+<p:sld xmlns:a="http://schemas.openxmlformats.org/drawingml/2006/main" xmlns:r="http://schemas.openxmlformats.org/officeDocument/2006/relationships" xmlns:p="http://schemas.openxmlformats.org/presentationml/2006/main">
+  <p:cSld>
+    <p:spTree>
+      <p:nvGrpSpPr>
+        <p:cNvPr id="1" name=""/>
+        <p:cNvGrpSpPr/>
+        <p:nvPr/>
+      </p:nvGrpSpPr>
+      <p:grpSpPr>
+        <a:xfrm>
+          <a:off x="0" y="0"/>
+          <a:ext cx="0" cy="0"/>
+          <a:chOff x="0" y="0"/>
+          <a:chExt cx="0" cy="0"/>
+        </a:xfrm>
+      </p:grpSpPr>
+      <p:sp>
+        <p:nvSpPr>
+          <p:cNvPr id="2" name="Title 1"/>
+          <p:cNvSpPr>
+            <a:spLocks noGrp="1"/>
+          </p:cNvSpPr>
+          <p:nvPr>
+            <p:ph type="ctrTitle"/>
+          </p:nvPr>
+        </p:nvSpPr>
+        <p:spPr>
+          <a:xfrm>
+            <a:off x="215778" y="1203598"/>
+            <a:ext cx="8460678" cy="1102519"/>
+          </a:xfrm>
+        </p:spPr>
+        <p:txBody>
+          <a:bodyPr/>
+          <a:lstStyle/>
+          <a:p>
+            <a:r>
+              <a:rPr lang="en-US"/>
+              <a:t>Reinforcement Learning to Enhance Spatial Reuse in Dense Wireless Networks</a:t>
+            </a:r>
+            <a:endParaRPr lang="en-US" dirty="0"/>
+          </a:p>
+        </p:txBody>
+      </p:sp>
+    </p:spTree>
+    <p:extLst>
+      <p:ext uri="{BB962C8B-B14F-4D97-AF65-F5344CB8AC3E}">
+        <p14:creationId xmlns:p14="http://schemas.microsoft.com/office/powerpoint/2010/main" val="1161458485"/>
+      </p:ext>
+    </p:extLst>
+  </p:cSld>
+  <p:clrMapOvr>
+    <a:masterClrMapping/>
+  </p:clrMapOvr>
 </p:sld>
 </file>
 
@@ -6512,7 +6659,7 @@
           <a:bodyPr/>
           <a:lstStyle/>
           <a:p>
-            <a:endParaRPr lang="en-US"/>
+            <a:endParaRPr lang="en-US" dirty="0"/>
           </a:p>
         </p:txBody>
       </p:sp>
@@ -6636,25 +6783,23 @@
       </p:sp>
       <p:sp>
         <p:nvSpPr>
-          <p:cNvPr id="9" name="Rectangle 8"/>
+          <p:cNvPr id="13" name="Cube 12"/>
           <p:cNvSpPr/>
           <p:nvPr/>
         </p:nvSpPr>
         <p:spPr>
           <a:xfrm>
-            <a:off x="3510368" y="1766704"/>
-            <a:ext cx="2160240" cy="1307880"/>
-          </a:xfrm>
-          <a:prstGeom prst="rect">
-            <a:avLst/>
+            <a:off x="683568" y="1535992"/>
+            <a:ext cx="4271083" cy="688034"/>
+          </a:xfrm>
+          <a:prstGeom prst="cube">
+            <a:avLst>
+              <a:gd name="adj" fmla="val 9225"/>
+            </a:avLst>
           </a:prstGeom>
-          <a:solidFill>
-            <a:srgbClr val="FF0000"/>
-          </a:solidFill>
+          <a:noFill/>
           <a:ln>
-            <a:solidFill>
-              <a:schemeClr val="tx1"/>
-            </a:solidFill>
+            <a:noFill/>
           </a:ln>
         </p:spPr>
         <p:style>
@@ -6679,26 +6824,29 @@
           <a:p>
             <a:pPr algn="ctr"/>
             <a:r>
-              <a:rPr lang="en-US" sz="2400" b="1" dirty="0">
+              <a:rPr lang="en-US" dirty="0">
+                <a:solidFill>
+                  <a:schemeClr val="tx1"/>
+                </a:solidFill>
                 <a:latin typeface="Times New Roman" charset="0"/>
                 <a:ea typeface="Times New Roman" charset="0"/>
                 <a:cs typeface="Times New Roman" charset="0"/>
               </a:rPr>
-              <a:t>Coexistence issues in WNs</a:t>
-            </a:r>
-          </a:p>
-        </p:txBody>
-      </p:sp>
-      <p:sp>
-        <p:nvSpPr>
-          <p:cNvPr id="13" name="Cube 12"/>
+              <a:t>Computational power moving to the cloud (more communication)</a:t>
+            </a:r>
+          </a:p>
+        </p:txBody>
+      </p:sp>
+      <p:sp>
+        <p:nvSpPr>
+          <p:cNvPr id="14" name="Cube 13"/>
           <p:cNvSpPr/>
           <p:nvPr/>
         </p:nvSpPr>
         <p:spPr>
           <a:xfrm>
-            <a:off x="6121144" y="110683"/>
-            <a:ext cx="2244282" cy="1820112"/>
+            <a:off x="944500" y="3315222"/>
+            <a:ext cx="3317549" cy="408656"/>
           </a:xfrm>
           <a:prstGeom prst="cube">
             <a:avLst>
@@ -6707,9 +6855,7 @@
           </a:prstGeom>
           <a:noFill/>
           <a:ln>
-            <a:solidFill>
-              <a:srgbClr val="FF0000"/>
-            </a:solidFill>
+            <a:noFill/>
           </a:ln>
         </p:spPr>
         <p:style>
@@ -6734,7 +6880,7 @@
           <a:p>
             <a:pPr algn="ctr"/>
             <a:r>
-              <a:rPr lang="en-US" dirty="0">
+              <a:rPr lang="en-US" dirty="0" smtClean="0">
                 <a:solidFill>
                   <a:schemeClr val="tx1"/>
                 </a:solidFill>
@@ -6742,21 +6888,29 @@
                 <a:ea typeface="Times New Roman" charset="0"/>
                 <a:cs typeface="Times New Roman" charset="0"/>
               </a:rPr>
-              <a:t>Computational power moving to the cloud (more communication)</a:t>
-            </a:r>
-          </a:p>
-        </p:txBody>
-      </p:sp>
-      <p:sp>
-        <p:nvSpPr>
-          <p:cNvPr id="14" name="Cube 13"/>
+              <a:t>Heterogeneous deployments</a:t>
+            </a:r>
+            <a:endParaRPr lang="en-US" dirty="0">
+              <a:solidFill>
+                <a:schemeClr val="tx1"/>
+              </a:solidFill>
+              <a:latin typeface="Times New Roman" charset="0"/>
+              <a:ea typeface="Times New Roman" charset="0"/>
+              <a:cs typeface="Times New Roman" charset="0"/>
+            </a:endParaRPr>
+          </a:p>
+        </p:txBody>
+      </p:sp>
+      <p:sp>
+        <p:nvSpPr>
+          <p:cNvPr id="15" name="Cube 14"/>
           <p:cNvSpPr/>
           <p:nvPr/>
         </p:nvSpPr>
         <p:spPr>
           <a:xfrm>
-            <a:off x="5796136" y="3171111"/>
-            <a:ext cx="2244282" cy="1080120"/>
+            <a:off x="102304" y="2617338"/>
+            <a:ext cx="3879013" cy="386460"/>
           </a:xfrm>
           <a:prstGeom prst="cube">
             <a:avLst>
@@ -6765,9 +6919,7 @@
           </a:prstGeom>
           <a:noFill/>
           <a:ln>
-            <a:solidFill>
-              <a:srgbClr val="FF0000"/>
-            </a:solidFill>
+            <a:noFill/>
           </a:ln>
         </p:spPr>
         <p:style>
@@ -6792,7 +6944,7 @@
           <a:p>
             <a:pPr algn="ctr"/>
             <a:r>
-              <a:rPr lang="en-US" dirty="0" smtClean="0">
+              <a:rPr lang="en-US" dirty="0">
                 <a:solidFill>
                   <a:schemeClr val="tx1"/>
                 </a:solidFill>
@@ -6800,29 +6952,21 @@
                 <a:ea typeface="Times New Roman" charset="0"/>
                 <a:cs typeface="Times New Roman" charset="0"/>
               </a:rPr>
-              <a:t>Heterogeneous deployments</a:t>
-            </a:r>
-            <a:endParaRPr lang="en-US" dirty="0">
-              <a:solidFill>
-                <a:schemeClr val="tx1"/>
-              </a:solidFill>
-              <a:latin typeface="Times New Roman" charset="0"/>
-              <a:ea typeface="Times New Roman" charset="0"/>
-              <a:cs typeface="Times New Roman" charset="0"/>
-            </a:endParaRPr>
-          </a:p>
-        </p:txBody>
-      </p:sp>
-      <p:sp>
-        <p:nvSpPr>
-          <p:cNvPr id="15" name="Cube 14"/>
+              <a:t>New BW requirements of new apps</a:t>
+            </a:r>
+          </a:p>
+        </p:txBody>
+      </p:sp>
+      <p:sp>
+        <p:nvSpPr>
+          <p:cNvPr id="16" name="Cube 15"/>
           <p:cNvSpPr/>
           <p:nvPr/>
         </p:nvSpPr>
         <p:spPr>
           <a:xfrm>
-            <a:off x="1259632" y="3171111"/>
-            <a:ext cx="2019014" cy="1166172"/>
+            <a:off x="-124888" y="929894"/>
+            <a:ext cx="3345106" cy="436280"/>
           </a:xfrm>
           <a:prstGeom prst="cube">
             <a:avLst>
@@ -6831,9 +6975,7 @@
           </a:prstGeom>
           <a:noFill/>
           <a:ln>
-            <a:solidFill>
-              <a:srgbClr val="FF0000"/>
-            </a:solidFill>
+            <a:noFill/>
           </a:ln>
         </p:spPr>
         <p:style>
@@ -6866,21 +7008,21 @@
                 <a:ea typeface="Times New Roman" charset="0"/>
                 <a:cs typeface="Times New Roman" charset="0"/>
               </a:rPr>
-              <a:t>New BW requirements of new apps</a:t>
-            </a:r>
-          </a:p>
-        </p:txBody>
-      </p:sp>
-      <p:sp>
-        <p:nvSpPr>
-          <p:cNvPr id="16" name="Cube 15"/>
+              <a:t>Easiness of deployments</a:t>
+            </a:r>
+          </a:p>
+        </p:txBody>
+      </p:sp>
+      <p:sp>
+        <p:nvSpPr>
+          <p:cNvPr id="21" name="Cube 20"/>
           <p:cNvSpPr/>
           <p:nvPr/>
         </p:nvSpPr>
         <p:spPr>
           <a:xfrm>
-            <a:off x="1135026" y="901414"/>
-            <a:ext cx="1800200" cy="1068566"/>
+            <a:off x="102305" y="3963294"/>
+            <a:ext cx="1445360" cy="408656"/>
           </a:xfrm>
           <a:prstGeom prst="cube">
             <a:avLst>
@@ -6889,9 +7031,7 @@
           </a:prstGeom>
           <a:noFill/>
           <a:ln>
-            <a:solidFill>
-              <a:srgbClr val="FF0000"/>
-            </a:solidFill>
+            <a:noFill/>
           </a:ln>
         </p:spPr>
         <p:style>
@@ -6916,7 +7056,7 @@
           <a:p>
             <a:pPr algn="ctr"/>
             <a:r>
-              <a:rPr lang="en-US" dirty="0">
+              <a:rPr lang="mr-IN" smtClean="0">
                 <a:solidFill>
                   <a:schemeClr val="tx1"/>
                 </a:solidFill>
@@ -6924,167 +7064,74 @@
                 <a:ea typeface="Times New Roman" charset="0"/>
                 <a:cs typeface="Times New Roman" charset="0"/>
               </a:rPr>
-              <a:t>Easiness of deployments</a:t>
-            </a:r>
-          </a:p>
-        </p:txBody>
-      </p:sp>
-      <p:cxnSp>
-        <p:nvCxnSpPr>
-          <p:cNvPr id="17" name="Curved Connector 16"/>
-          <p:cNvCxnSpPr>
-            <a:stCxn id="16" idx="3"/>
-            <a:endCxn id="9" idx="1"/>
-          </p:cNvCxnSpPr>
+              <a:t>…</a:t>
+            </a:r>
+            <a:endParaRPr lang="en-US" dirty="0">
+              <a:solidFill>
+                <a:schemeClr val="tx1"/>
+              </a:solidFill>
+              <a:latin typeface="Times New Roman" charset="0"/>
+              <a:ea typeface="Times New Roman" charset="0"/>
+              <a:cs typeface="Times New Roman" charset="0"/>
+            </a:endParaRPr>
+          </a:p>
+        </p:txBody>
+      </p:sp>
+      <p:sp>
+        <p:nvSpPr>
+          <p:cNvPr id="18" name="Explosion 2 17"/>
+          <p:cNvSpPr/>
           <p:nvPr/>
-        </p:nvCxnSpPr>
-        <p:spPr>
-          <a:xfrm rot="16200000" flipH="1">
-            <a:off x="2522771" y="1433047"/>
-            <a:ext cx="450664" cy="1524530"/>
-          </a:xfrm>
-          <a:prstGeom prst="curvedConnector2">
+        </p:nvSpPr>
+        <p:spPr>
+          <a:xfrm>
+            <a:off x="5364088" y="1224568"/>
+            <a:ext cx="3312368" cy="2294982"/>
+          </a:xfrm>
+          <a:prstGeom prst="irregularSeal2">
             <a:avLst/>
           </a:prstGeom>
-          <a:ln w="38100">
+          <a:solidFill>
+            <a:srgbClr val="FF0000"/>
+          </a:solidFill>
+          <a:ln>
             <a:solidFill>
               <a:schemeClr val="tx1"/>
             </a:solidFill>
-            <a:tailEnd type="triangle"/>
           </a:ln>
         </p:spPr>
         <p:style>
-          <a:lnRef idx="1">
-            <a:schemeClr val="accent1"/>
+          <a:lnRef idx="2">
+            <a:schemeClr val="accent1">
+              <a:shade val="50000"/>
+            </a:schemeClr>
           </a:lnRef>
-          <a:fillRef idx="0">
+          <a:fillRef idx="1">
             <a:schemeClr val="accent1"/>
           </a:fillRef>
           <a:effectRef idx="0">
             <a:schemeClr val="accent1"/>
           </a:effectRef>
           <a:fontRef idx="minor">
-            <a:schemeClr val="tx1"/>
+            <a:schemeClr val="lt1"/>
           </a:fontRef>
         </p:style>
-      </p:cxnSp>
-      <p:cxnSp>
-        <p:nvCxnSpPr>
-          <p:cNvPr id="20" name="Curved Connector 19"/>
-          <p:cNvCxnSpPr>
-            <a:stCxn id="15" idx="5"/>
-            <a:endCxn id="9" idx="2"/>
-          </p:cNvCxnSpPr>
-          <p:nvPr/>
-        </p:nvCxnSpPr>
-        <p:spPr>
-          <a:xfrm flipV="1">
-            <a:off x="3278646" y="3074584"/>
-            <a:ext cx="1311842" cy="625823"/>
-          </a:xfrm>
-          <a:prstGeom prst="curvedConnector2">
-            <a:avLst/>
-          </a:prstGeom>
-          <a:ln w="38100">
-            <a:solidFill>
-              <a:schemeClr val="tx1"/>
-            </a:solidFill>
-            <a:tailEnd type="triangle"/>
-          </a:ln>
-        </p:spPr>
-        <p:style>
-          <a:lnRef idx="1">
-            <a:schemeClr val="accent1"/>
-          </a:lnRef>
-          <a:fillRef idx="0">
-            <a:schemeClr val="accent1"/>
-          </a:fillRef>
-          <a:effectRef idx="0">
-            <a:schemeClr val="accent1"/>
-          </a:effectRef>
-          <a:fontRef idx="minor">
-            <a:schemeClr val="tx1"/>
-          </a:fontRef>
-        </p:style>
-      </p:cxnSp>
-      <p:cxnSp>
-        <p:nvCxnSpPr>
-          <p:cNvPr id="24" name="Curved Connector 23"/>
-          <p:cNvCxnSpPr>
-            <a:stCxn id="14" idx="0"/>
-            <a:endCxn id="9" idx="3"/>
-          </p:cNvCxnSpPr>
-          <p:nvPr/>
-        </p:nvCxnSpPr>
-        <p:spPr>
-          <a:xfrm rot="16200000" flipV="1">
-            <a:off x="5944120" y="2147133"/>
-            <a:ext cx="750467" cy="1297490"/>
-          </a:xfrm>
-          <a:prstGeom prst="curvedConnector2">
-            <a:avLst/>
-          </a:prstGeom>
-          <a:ln w="38100">
-            <a:solidFill>
-              <a:schemeClr val="tx1"/>
-            </a:solidFill>
-            <a:tailEnd type="triangle"/>
-          </a:ln>
-        </p:spPr>
-        <p:style>
-          <a:lnRef idx="1">
-            <a:schemeClr val="accent1"/>
-          </a:lnRef>
-          <a:fillRef idx="0">
-            <a:schemeClr val="accent1"/>
-          </a:fillRef>
-          <a:effectRef idx="0">
-            <a:schemeClr val="accent1"/>
-          </a:effectRef>
-          <a:fontRef idx="minor">
-            <a:schemeClr val="tx1"/>
-          </a:fontRef>
-        </p:style>
-      </p:cxnSp>
-      <p:cxnSp>
-        <p:nvCxnSpPr>
-          <p:cNvPr id="27" name="Curved Connector 26"/>
-          <p:cNvCxnSpPr>
-            <a:stCxn id="13" idx="2"/>
-            <a:endCxn id="9" idx="0"/>
-          </p:cNvCxnSpPr>
-          <p:nvPr/>
-        </p:nvCxnSpPr>
-        <p:spPr>
-          <a:xfrm rot="10800000" flipV="1">
-            <a:off x="4590488" y="1104692"/>
-            <a:ext cx="1530656" cy="662012"/>
-          </a:xfrm>
-          <a:prstGeom prst="curvedConnector2">
-            <a:avLst/>
-          </a:prstGeom>
-          <a:ln w="38100">
-            <a:solidFill>
-              <a:schemeClr val="tx1"/>
-            </a:solidFill>
-            <a:tailEnd type="triangle"/>
-          </a:ln>
-        </p:spPr>
-        <p:style>
-          <a:lnRef idx="1">
-            <a:schemeClr val="accent1"/>
-          </a:lnRef>
-          <a:fillRef idx="0">
-            <a:schemeClr val="accent1"/>
-          </a:fillRef>
-          <a:effectRef idx="0">
-            <a:schemeClr val="accent1"/>
-          </a:effectRef>
-          <a:fontRef idx="minor">
-            <a:schemeClr val="tx1"/>
-          </a:fontRef>
-        </p:style>
-      </p:cxnSp>
+        <p:txBody>
+          <a:bodyPr rtlCol="0" anchor="ctr"/>
+          <a:lstStyle/>
+          <a:p>
+            <a:pPr algn="ctr"/>
+            <a:r>
+              <a:rPr lang="en-US" b="1" dirty="0">
+                <a:latin typeface="Times New Roman" charset="0"/>
+                <a:ea typeface="Times New Roman" charset="0"/>
+                <a:cs typeface="Times New Roman" charset="0"/>
+              </a:rPr>
+              <a:t>Coexistence issues in WNs</a:t>
+            </a:r>
+          </a:p>
+        </p:txBody>
+      </p:sp>
     </p:spTree>
     <p:extLst>
       <p:ext uri="{BB962C8B-B14F-4D97-AF65-F5344CB8AC3E}">
@@ -7549,66 +7596,10 @@
           </a:p>
         </p:txBody>
       </p:sp>
-      <p:sp>
-        <p:nvSpPr>
-          <p:cNvPr id="20" name="Rectangle 19"/>
-          <p:cNvSpPr/>
-          <p:nvPr/>
-        </p:nvSpPr>
-        <p:spPr>
-          <a:xfrm>
-            <a:off x="3510368" y="1766704"/>
-            <a:ext cx="2160240" cy="1307880"/>
-          </a:xfrm>
-          <a:prstGeom prst="rect">
-            <a:avLst/>
-          </a:prstGeom>
-          <a:solidFill>
-            <a:srgbClr val="FF0000"/>
-          </a:solidFill>
-          <a:ln>
-            <a:solidFill>
-              <a:schemeClr val="tx1"/>
-            </a:solidFill>
-          </a:ln>
-        </p:spPr>
-        <p:style>
-          <a:lnRef idx="2">
-            <a:schemeClr val="accent1">
-              <a:shade val="50000"/>
-            </a:schemeClr>
-          </a:lnRef>
-          <a:fillRef idx="1">
-            <a:schemeClr val="accent1"/>
-          </a:fillRef>
-          <a:effectRef idx="0">
-            <a:schemeClr val="accent1"/>
-          </a:effectRef>
-          <a:fontRef idx="minor">
-            <a:schemeClr val="lt1"/>
-          </a:fontRef>
-        </p:style>
-        <p:txBody>
-          <a:bodyPr rtlCol="0" anchor="ctr"/>
-          <a:lstStyle/>
-          <a:p>
-            <a:pPr algn="ctr"/>
-            <a:r>
-              <a:rPr lang="en-US" sz="2400" b="1" dirty="0">
-                <a:latin typeface="Times New Roman" charset="0"/>
-                <a:ea typeface="Times New Roman" charset="0"/>
-                <a:cs typeface="Times New Roman" charset="0"/>
-              </a:rPr>
-              <a:t>Coexistence issues in WNs</a:t>
-            </a:r>
-          </a:p>
-        </p:txBody>
-      </p:sp>
       <p:cxnSp>
         <p:nvCxnSpPr>
           <p:cNvPr id="28" name="Curved Connector 27"/>
           <p:cNvCxnSpPr>
-            <a:stCxn id="20" idx="2"/>
             <a:endCxn id="2" idx="3"/>
           </p:cNvCxnSpPr>
           <p:nvPr/>
@@ -7649,7 +7640,6 @@
         <p:nvCxnSpPr>
           <p:cNvPr id="32" name="Curved Connector 31"/>
           <p:cNvCxnSpPr>
-            <a:stCxn id="20" idx="3"/>
             <a:endCxn id="14" idx="0"/>
           </p:cNvCxnSpPr>
           <p:nvPr/>
@@ -7688,7 +7678,6 @@
         <p:nvCxnSpPr>
           <p:cNvPr id="37" name="Curved Connector 36"/>
           <p:cNvCxnSpPr>
-            <a:stCxn id="20" idx="0"/>
             <a:endCxn id="10" idx="2"/>
           </p:cNvCxnSpPr>
           <p:nvPr/>
@@ -7723,6 +7712,61 @@
           </a:fontRef>
         </p:style>
       </p:cxnSp>
+      <p:sp>
+        <p:nvSpPr>
+          <p:cNvPr id="12" name="Explosion 2 11"/>
+          <p:cNvSpPr/>
+          <p:nvPr/>
+        </p:nvSpPr>
+        <p:spPr>
+          <a:xfrm>
+            <a:off x="3090755" y="1363029"/>
+            <a:ext cx="3312368" cy="2294982"/>
+          </a:xfrm>
+          <a:prstGeom prst="irregularSeal2">
+            <a:avLst/>
+          </a:prstGeom>
+          <a:solidFill>
+            <a:srgbClr val="FF0000"/>
+          </a:solidFill>
+          <a:ln>
+            <a:solidFill>
+              <a:schemeClr val="tx1"/>
+            </a:solidFill>
+          </a:ln>
+        </p:spPr>
+        <p:style>
+          <a:lnRef idx="2">
+            <a:schemeClr val="accent1">
+              <a:shade val="50000"/>
+            </a:schemeClr>
+          </a:lnRef>
+          <a:fillRef idx="1">
+            <a:schemeClr val="accent1"/>
+          </a:fillRef>
+          <a:effectRef idx="0">
+            <a:schemeClr val="accent1"/>
+          </a:effectRef>
+          <a:fontRef idx="minor">
+            <a:schemeClr val="lt1"/>
+          </a:fontRef>
+        </p:style>
+        <p:txBody>
+          <a:bodyPr rtlCol="0" anchor="ctr"/>
+          <a:lstStyle/>
+          <a:p>
+            <a:pPr algn="ctr"/>
+            <a:r>
+              <a:rPr lang="en-US" b="1" dirty="0">
+                <a:latin typeface="Times New Roman" charset="0"/>
+                <a:ea typeface="Times New Roman" charset="0"/>
+                <a:cs typeface="Times New Roman" charset="0"/>
+              </a:rPr>
+              <a:t>Coexistence issues in WNs</a:t>
+            </a:r>
+          </a:p>
+        </p:txBody>
+      </p:sp>
     </p:spTree>
     <p:extLst>
       <p:ext uri="{BB962C8B-B14F-4D97-AF65-F5344CB8AC3E}">
@@ -7755,7 +7799,7 @@
       </p:grpSpPr>
       <p:sp>
         <p:nvSpPr>
-          <p:cNvPr id="2" name="Title 1"/>
+          <p:cNvPr id="4" name="Title 3"/>
           <p:cNvSpPr>
             <a:spLocks noGrp="1"/>
           </p:cNvSpPr>
@@ -7769,17 +7813,85 @@
           <a:lstStyle/>
           <a:p>
             <a:r>
-              <a:rPr lang="en-US" sz="4400" dirty="0" smtClean="0"/>
-              <a:t>Spatial Reuse in Wireless Networks</a:t>
-            </a:r>
-            <a:endParaRPr lang="en-US" sz="4400" dirty="0"/>
+              <a:rPr lang="en-US" dirty="0" smtClean="0"/>
+              <a:t>IEEE 802.11 WLANs</a:t>
+            </a:r>
+            <a:endParaRPr lang="en-US" dirty="0"/>
+          </a:p>
+        </p:txBody>
+      </p:sp>
+      <p:sp>
+        <p:nvSpPr>
+          <p:cNvPr id="5" name="TextBox 4"/>
+          <p:cNvSpPr txBox="1"/>
+          <p:nvPr/>
+        </p:nvSpPr>
+        <p:spPr>
+          <a:xfrm>
+            <a:off x="349070" y="1275606"/>
+            <a:ext cx="8183369" cy="369332"/>
+          </a:xfrm>
+          <a:prstGeom prst="rect">
+            <a:avLst/>
+          </a:prstGeom>
+          <a:noFill/>
+        </p:spPr>
+        <p:txBody>
+          <a:bodyPr wrap="square" rtlCol="0">
+            <a:spAutoFit/>
+          </a:bodyPr>
+          <a:lstStyle/>
+          <a:p>
+            <a:r>
+              <a:rPr lang="en-US" dirty="0" smtClean="0"/>
+              <a:t>CSMA/CA is sub-optimal -&gt; suffers from </a:t>
+            </a:r>
+            <a:r>
+              <a:rPr lang="en-US" smtClean="0"/>
+              <a:t>problem nodes</a:t>
+            </a:r>
+            <a:endParaRPr lang="en-US"/>
+          </a:p>
+        </p:txBody>
+      </p:sp>
+      <p:sp>
+        <p:nvSpPr>
+          <p:cNvPr id="13" name="TextBox 12"/>
+          <p:cNvSpPr txBox="1"/>
+          <p:nvPr/>
+        </p:nvSpPr>
+        <p:spPr>
+          <a:xfrm>
+            <a:off x="349069" y="1886421"/>
+            <a:ext cx="8183369" cy="369332"/>
+          </a:xfrm>
+          <a:prstGeom prst="rect">
+            <a:avLst/>
+          </a:prstGeom>
+          <a:noFill/>
+        </p:spPr>
+        <p:txBody>
+          <a:bodyPr wrap="square" rtlCol="0">
+            <a:spAutoFit/>
+          </a:bodyPr>
+          <a:lstStyle/>
+          <a:p>
+            <a:r>
+              <a:rPr lang="en-US" dirty="0" smtClean="0"/>
+              <a:t>Explain topologies, future scenarios, DCF operation</a:t>
+            </a:r>
+            <a:r>
+              <a:rPr lang="mr-IN" dirty="0" smtClean="0"/>
+              <a:t>…</a:t>
+            </a:r>
+            <a:endParaRPr lang="en-US" dirty="0"/>
           </a:p>
         </p:txBody>
       </p:sp>
     </p:spTree>
     <p:extLst>
       <p:ext uri="{BB962C8B-B14F-4D97-AF65-F5344CB8AC3E}">
-        <p14:creationId xmlns:p14="http://schemas.microsoft.com/office/powerpoint/2010/main" val="1042083749"/>
+        <p14:creationId xmlns:p14="http://schemas.microsoft.com/office/powerpoint/2010/main" val="31881410"/>
       </p:ext>
     </p:extLst>
   </p:cSld>
@@ -7808,49 +7920,6 @@
       </p:grpSpPr>
       <p:sp>
         <p:nvSpPr>
-          <p:cNvPr id="2" name="Content Placeholder 1"/>
-          <p:cNvSpPr>
-            <a:spLocks noGrp="1"/>
-          </p:cNvSpPr>
-          <p:nvPr>
-            <p:ph idx="1"/>
-          </p:nvPr>
-        </p:nvSpPr>
-        <p:spPr/>
-        <p:txBody>
-          <a:bodyPr/>
-          <a:lstStyle/>
-          <a:p>
-            <a:endParaRPr lang="en-US"/>
-          </a:p>
-        </p:txBody>
-      </p:sp>
-      <p:sp>
-        <p:nvSpPr>
-          <p:cNvPr id="3" name="Slide Number Placeholder 2"/>
-          <p:cNvSpPr>
-            <a:spLocks noGrp="1"/>
-          </p:cNvSpPr>
-          <p:nvPr>
-            <p:ph type="sldNum" sz="quarter" idx="4"/>
-          </p:nvPr>
-        </p:nvSpPr>
-        <p:spPr/>
-        <p:txBody>
-          <a:bodyPr/>
-          <a:lstStyle/>
-          <a:p>
-            <a:fld id="{DAF489CC-3B7A-4DA5-A8C0-4984788D0EC5}" type="slidenum">
-              <a:rPr lang="nl-NL" smtClean="0"/>
-              <a:pPr/>
-              <a:t>8</a:t>
-            </a:fld>
-            <a:endParaRPr lang="nl-NL" dirty="0"/>
-          </a:p>
-        </p:txBody>
-      </p:sp>
-      <p:sp>
-        <p:nvSpPr>
           <p:cNvPr id="4" name="Title 3"/>
           <p:cNvSpPr>
             <a:spLocks noGrp="1"/>
@@ -7864,14 +7933,108 @@
           <a:bodyPr/>
           <a:lstStyle/>
           <a:p>
-            <a:endParaRPr lang="en-US"/>
+            <a:r>
+              <a:rPr lang="en-US" dirty="0" smtClean="0"/>
+              <a:t>Motivation - Recap</a:t>
+            </a:r>
+            <a:endParaRPr lang="en-US" dirty="0"/>
+          </a:p>
+        </p:txBody>
+      </p:sp>
+      <p:sp>
+        <p:nvSpPr>
+          <p:cNvPr id="5" name="TextBox 4"/>
+          <p:cNvSpPr txBox="1"/>
+          <p:nvPr/>
+        </p:nvSpPr>
+        <p:spPr>
+          <a:xfrm>
+            <a:off x="349070" y="1275606"/>
+            <a:ext cx="8183369" cy="369332"/>
+          </a:xfrm>
+          <a:prstGeom prst="rect">
+            <a:avLst/>
+          </a:prstGeom>
+          <a:noFill/>
+        </p:spPr>
+        <p:txBody>
+          <a:bodyPr wrap="square" rtlCol="0">
+            <a:spAutoFit/>
+          </a:bodyPr>
+          <a:lstStyle/>
+          <a:p>
+            <a:r>
+              <a:rPr lang="en-US" smtClean="0"/>
+              <a:t>Coexistence issues in WNs</a:t>
+            </a:r>
+            <a:endParaRPr lang="en-US" dirty="0"/>
+          </a:p>
+        </p:txBody>
+      </p:sp>
+      <p:sp>
+        <p:nvSpPr>
+          <p:cNvPr id="13" name="TextBox 12"/>
+          <p:cNvSpPr txBox="1"/>
+          <p:nvPr/>
+        </p:nvSpPr>
+        <p:spPr>
+          <a:xfrm>
+            <a:off x="349069" y="1886421"/>
+            <a:ext cx="8183369" cy="369332"/>
+          </a:xfrm>
+          <a:prstGeom prst="rect">
+            <a:avLst/>
+          </a:prstGeom>
+          <a:noFill/>
+        </p:spPr>
+        <p:txBody>
+          <a:bodyPr wrap="square" rtlCol="0">
+            <a:spAutoFit/>
+          </a:bodyPr>
+          <a:lstStyle/>
+          <a:p>
+            <a:r>
+              <a:rPr lang="en-US" dirty="0" smtClean="0"/>
+              <a:t>CSMA/CA is sub-optimal -&gt; suffers from problem nodes</a:t>
+            </a:r>
+            <a:endParaRPr lang="en-US" dirty="0"/>
+          </a:p>
+        </p:txBody>
+      </p:sp>
+      <p:sp>
+        <p:nvSpPr>
+          <p:cNvPr id="6" name="TextBox 5"/>
+          <p:cNvSpPr txBox="1"/>
+          <p:nvPr/>
+        </p:nvSpPr>
+        <p:spPr>
+          <a:xfrm>
+            <a:off x="349069" y="2497236"/>
+            <a:ext cx="8183369" cy="369332"/>
+          </a:xfrm>
+          <a:prstGeom prst="rect">
+            <a:avLst/>
+          </a:prstGeom>
+          <a:noFill/>
+        </p:spPr>
+        <p:txBody>
+          <a:bodyPr wrap="square" rtlCol="0">
+            <a:spAutoFit/>
+          </a:bodyPr>
+          <a:lstStyle/>
+          <a:p>
+            <a:r>
+              <a:rPr lang="en-US" smtClean="0"/>
+              <a:t>Moving into AI</a:t>
+            </a:r>
+            <a:endParaRPr lang="en-US" dirty="0"/>
           </a:p>
         </p:txBody>
       </p:sp>
     </p:spTree>
     <p:extLst>
       <p:ext uri="{BB962C8B-B14F-4D97-AF65-F5344CB8AC3E}">
-        <p14:creationId xmlns:p14="http://schemas.microsoft.com/office/powerpoint/2010/main" val="160779116"/>
+        <p14:creationId xmlns:p14="http://schemas.microsoft.com/office/powerpoint/2010/main" val="1175259036"/>
       </p:ext>
     </p:extLst>
   </p:cSld>
@@ -7915,7 +8078,7 @@
           <a:p>
             <a:r>
               <a:rPr lang="en-US" sz="4400" dirty="0" smtClean="0"/>
-              <a:t>Problem Formulation</a:t>
+              <a:t>Spatial Reuse in Wireless Networks</a:t>
             </a:r>
             <a:endParaRPr lang="en-US" sz="4400" dirty="0"/>
           </a:p>
@@ -7924,7 +8087,7 @@
     </p:spTree>
     <p:extLst>
       <p:ext uri="{BB962C8B-B14F-4D97-AF65-F5344CB8AC3E}">
-        <p14:creationId xmlns:p14="http://schemas.microsoft.com/office/powerpoint/2010/main" val="680174686"/>
+        <p14:creationId xmlns:p14="http://schemas.microsoft.com/office/powerpoint/2010/main" val="1042083749"/>
       </p:ext>
     </p:extLst>
   </p:cSld>

</xml_diff>